<commit_message>
Size of bio and photo reduced in screen of contact for aesthetic purposes
</commit_message>
<xml_diff>
--- a/screens.pptx
+++ b/screens.pptx
@@ -13645,7 +13645,7 @@
           <a:p>
             <a:fld id="{00791689-1FA3-4096-A498-9F8277E8D064}" type="datetimeFigureOut">
               <a:rPr lang="en-US" smtClean="0"/>
-              <a:t>10/18/2018</a:t>
+              <a:t>10/19/2018</a:t>
             </a:fld>
             <a:endParaRPr lang="en-US"/>
           </a:p>
@@ -18708,7 +18708,7 @@
         <p:spPr>
           <a:xfrm>
             <a:off x="-13407" y="1571685"/>
-            <a:ext cx="9143999" cy="4524315"/>
+            <a:ext cx="9143999" cy="4739759"/>
           </a:xfrm>
           <a:prstGeom prst="rect">
             <a:avLst/>
@@ -18876,72 +18876,95 @@
             </a:br>
             <a:r>
               <a:rPr lang="es-ES" sz="1400" dirty="0" smtClean="0">
-                <a:latin typeface="Bahnschrift" panose="020B0502040204020203" pitchFamily="34" charset="0"/>
+                <a:latin typeface="Bahnschrift Light" panose="020B0502040204020203" pitchFamily="34" charset="0"/>
               </a:rPr>
               <a:t>E-mail: </a:t>
             </a:r>
             <a:r>
               <a:rPr lang="es-ES" sz="1400" dirty="0" smtClean="0">
-                <a:latin typeface="Bahnschrift" panose="020B0502040204020203" pitchFamily="34" charset="0"/>
+                <a:latin typeface="Bahnschrift Light" panose="020B0502040204020203" pitchFamily="34" charset="0"/>
                 <a:hlinkClick r:id="rId2"/>
               </a:rPr>
               <a:t>osmarbriones@outlook.com</a:t>
             </a:r>
             <a:r>
               <a:rPr lang="es-ES" sz="1400" dirty="0" smtClean="0">
-                <a:latin typeface="Bahnschrift" panose="020B0502040204020203" pitchFamily="34" charset="0"/>
+                <a:latin typeface="Bahnschrift Light" panose="020B0502040204020203" pitchFamily="34" charset="0"/>
               </a:rPr>
               <a:t/>
             </a:r>
             <a:br>
               <a:rPr lang="es-ES" sz="1400" dirty="0" smtClean="0">
-                <a:latin typeface="Bahnschrift" panose="020B0502040204020203" pitchFamily="34" charset="0"/>
+                <a:latin typeface="Bahnschrift Light" panose="020B0502040204020203" pitchFamily="34" charset="0"/>
               </a:rPr>
             </a:br>
             <a:r>
               <a:rPr lang="es-ES" sz="1400" dirty="0" smtClean="0">
-                <a:latin typeface="Bahnschrift" panose="020B0502040204020203" pitchFamily="34" charset="0"/>
+                <a:latin typeface="Bahnschrift Light" panose="020B0502040204020203" pitchFamily="34" charset="0"/>
               </a:rPr>
               <a:t>Facebook: </a:t>
             </a:r>
             <a:r>
               <a:rPr lang="es-ES" sz="1400" dirty="0" err="1" smtClean="0">
-                <a:latin typeface="Bahnschrift" panose="020B0502040204020203" pitchFamily="34" charset="0"/>
+                <a:latin typeface="Bahnschrift Light" panose="020B0502040204020203" pitchFamily="34" charset="0"/>
               </a:rPr>
               <a:t>osmar.ab</a:t>
             </a:r>
             <a:r>
               <a:rPr lang="es-ES" sz="1400" dirty="0" smtClean="0">
-                <a:latin typeface="Bahnschrift" panose="020B0502040204020203" pitchFamily="34" charset="0"/>
+                <a:latin typeface="Bahnschrift Light" panose="020B0502040204020203" pitchFamily="34" charset="0"/>
               </a:rPr>
               <a:t/>
             </a:r>
             <a:br>
               <a:rPr lang="es-ES" sz="1400" dirty="0" smtClean="0">
-                <a:latin typeface="Bahnschrift" panose="020B0502040204020203" pitchFamily="34" charset="0"/>
+                <a:latin typeface="Bahnschrift Light" panose="020B0502040204020203" pitchFamily="34" charset="0"/>
               </a:rPr>
             </a:br>
             <a:r>
               <a:rPr lang="es-ES" sz="1400" dirty="0" smtClean="0">
-                <a:latin typeface="Bahnschrift" panose="020B0502040204020203" pitchFamily="34" charset="0"/>
+                <a:latin typeface="Bahnschrift Light" panose="020B0502040204020203" pitchFamily="34" charset="0"/>
               </a:rPr>
               <a:t>Twitter: @</a:t>
             </a:r>
             <a:r>
               <a:rPr lang="es-ES" sz="1400" dirty="0" err="1" smtClean="0">
-                <a:latin typeface="Bahnschrift" panose="020B0502040204020203" pitchFamily="34" charset="0"/>
+                <a:latin typeface="Bahnschrift Light" panose="020B0502040204020203" pitchFamily="34" charset="0"/>
+              </a:rPr>
+              <a:t>osmarbriones</a:t>
+            </a:r>
+            <a:endParaRPr lang="es-ES" sz="1400" dirty="0" smtClean="0">
+              <a:latin typeface="Bahnschrift Light" panose="020B0502040204020203" pitchFamily="34" charset="0"/>
+            </a:endParaRPr>
+          </a:p>
+          <a:p>
+            <a:r>
+              <a:rPr lang="es-ES" sz="1400" dirty="0" err="1" smtClean="0">
+                <a:latin typeface="Bahnschrift Light" panose="020B0502040204020203" pitchFamily="34" charset="0"/>
+              </a:rPr>
+              <a:t>LinkdedIn</a:t>
+            </a:r>
+            <a:r>
+              <a:rPr lang="es-ES" sz="1400" dirty="0" smtClean="0">
+                <a:latin typeface="Bahnschrift Light" panose="020B0502040204020203" pitchFamily="34" charset="0"/>
+              </a:rPr>
+              <a:t>: </a:t>
+            </a:r>
+            <a:r>
+              <a:rPr lang="es-ES" sz="1400" dirty="0" err="1" smtClean="0">
+                <a:latin typeface="Bahnschrift Light" panose="020B0502040204020203" pitchFamily="34" charset="0"/>
               </a:rPr>
               <a:t>osmarbriones</a:t>
             </a:r>
             <a:r>
               <a:rPr lang="es-ES" sz="1400" dirty="0" smtClean="0">
-                <a:latin typeface="Bahnschrift" panose="020B0502040204020203" pitchFamily="34" charset="0"/>
+                <a:latin typeface="Bahnschrift Light" panose="020B0502040204020203" pitchFamily="34" charset="0"/>
               </a:rPr>
               <a:t/>
             </a:r>
             <a:br>
               <a:rPr lang="es-ES" sz="1400" dirty="0" smtClean="0">
-                <a:latin typeface="Bahnschrift" panose="020B0502040204020203" pitchFamily="34" charset="0"/>
+                <a:latin typeface="Bahnschrift Light" panose="020B0502040204020203" pitchFamily="34" charset="0"/>
               </a:rPr>
             </a:br>
             <a:r>
@@ -19007,116 +19030,99 @@
           </a:p>
         </p:txBody>
       </p:sp>
-      <p:grpSp>
-        <p:nvGrpSpPr>
-          <p:cNvPr id="5" name="Group 4"/>
-          <p:cNvGrpSpPr/>
+      <p:pic>
+        <p:nvPicPr>
+          <p:cNvPr id="6" name="Picture 5"/>
+          <p:cNvPicPr>
+            <a:picLocks noChangeAspect="1"/>
+          </p:cNvPicPr>
           <p:nvPr/>
-        </p:nvGrpSpPr>
-        <p:grpSpPr>
+        </p:nvPicPr>
+        <p:blipFill>
+          <a:blip r:embed="rId3" cstate="print">
+            <a:extLst>
+              <a:ext uri="{28A0092B-C50C-407E-A947-70E740481C1C}">
+                <a14:useLocalDpi xmlns:a14="http://schemas.microsoft.com/office/drawing/2010/main" val="0"/>
+              </a:ext>
+            </a:extLst>
+          </a:blip>
+          <a:stretch>
+            <a:fillRect/>
+          </a:stretch>
+        </p:blipFill>
+        <p:spPr>
           <a:xfrm>
-            <a:off x="129250" y="2714685"/>
-            <a:ext cx="8794770" cy="2421202"/>
-            <a:chOff x="129250" y="4013888"/>
-            <a:chExt cx="8794770" cy="2421202"/>
+            <a:off x="7644336" y="3810000"/>
+            <a:ext cx="1279683" cy="1478287"/>
           </a:xfrm>
-        </p:grpSpPr>
-        <p:pic>
-          <p:nvPicPr>
-            <p:cNvPr id="6" name="Picture 5"/>
-            <p:cNvPicPr>
-              <a:picLocks noChangeAspect="1"/>
-            </p:cNvPicPr>
-            <p:nvPr/>
-          </p:nvPicPr>
-          <p:blipFill>
-            <a:blip r:embed="rId3" cstate="print">
-              <a:extLst>
-                <a:ext uri="{28A0092B-C50C-407E-A947-70E740481C1C}">
-                  <a14:useLocalDpi xmlns:a14="http://schemas.microsoft.com/office/drawing/2010/main" val="0"/>
-                </a:ext>
-              </a:extLst>
-            </a:blip>
-            <a:stretch>
-              <a:fillRect/>
-            </a:stretch>
-          </p:blipFill>
-          <p:spPr>
-            <a:xfrm>
-              <a:off x="6828100" y="4013888"/>
-              <a:ext cx="2095920" cy="2421202"/>
-            </a:xfrm>
-            <a:prstGeom prst="ellipse">
-              <a:avLst/>
-            </a:prstGeom>
-            <a:ln w="19050" cap="rnd">
-              <a:noFill/>
-            </a:ln>
-            <a:effectLst>
-              <a:outerShdw blurRad="50800" dist="38100" dir="2700000" algn="tl" rotWithShape="0">
-                <a:prstClr val="black">
-                  <a:alpha val="40000"/>
-                </a:prstClr>
-              </a:outerShdw>
-            </a:effectLst>
-            <a:scene3d>
-              <a:camera prst="orthographicFront"/>
-              <a:lightRig rig="contrasting" dir="t">
-                <a:rot lat="0" lon="0" rev="3000000"/>
-              </a:lightRig>
-            </a:scene3d>
-            <a:sp3d contourW="7620">
-              <a:bevelT w="95250" h="31750"/>
-              <a:contourClr>
-                <a:srgbClr val="333333"/>
-              </a:contourClr>
-            </a:sp3d>
-          </p:spPr>
-        </p:pic>
-        <p:sp>
-          <p:nvSpPr>
-            <p:cNvPr id="7" name="TextBox 6"/>
-            <p:cNvSpPr txBox="1"/>
-            <p:nvPr/>
-          </p:nvSpPr>
-          <p:spPr>
-            <a:xfrm>
-              <a:off x="129250" y="4485825"/>
-              <a:ext cx="6629400" cy="1754326"/>
-            </a:xfrm>
-            <a:prstGeom prst="rect">
-              <a:avLst/>
-            </a:prstGeom>
+          <a:prstGeom prst="rect">
+            <a:avLst/>
+          </a:prstGeom>
+          <a:noFill/>
+          <a:ln>
             <a:noFill/>
-          </p:spPr>
-          <p:txBody>
-            <a:bodyPr wrap="square" rtlCol="0">
-              <a:spAutoFit/>
-            </a:bodyPr>
-            <a:lstStyle/>
-            <a:p>
-              <a:pPr algn="just"/>
-              <a:r>
-                <a:rPr lang="en-US" dirty="0" smtClean="0"/>
-                <a:t>I am a Mexican software developer that loves his career and dreams so high. I love altruism, development, videogames, writing, chess, soccer, computers and introspection. If you want to know more about my preparation, skills and experience, I suggest you to visit my </a:t>
-              </a:r>
-              <a:r>
-                <a:rPr lang="en-US" dirty="0" err="1" smtClean="0"/>
-                <a:t>linkedIn</a:t>
-              </a:r>
-              <a:r>
-                <a:rPr lang="en-US" dirty="0"/>
-                <a:t> </a:t>
-              </a:r>
-              <a:r>
-                <a:rPr lang="en-US" dirty="0" smtClean="0"/>
-                <a:t>which is a platform more focused in that aspect, this page is for my personal and continuous improvement.</a:t>
-              </a:r>
-              <a:endParaRPr lang="en-US" dirty="0"/>
-            </a:p>
-          </p:txBody>
-        </p:sp>
-      </p:grpSp>
+          </a:ln>
+        </p:spPr>
+      </p:pic>
+      <p:sp>
+        <p:nvSpPr>
+          <p:cNvPr id="7" name="TextBox 6"/>
+          <p:cNvSpPr txBox="1"/>
+          <p:nvPr/>
+        </p:nvSpPr>
+        <p:spPr>
+          <a:xfrm>
+            <a:off x="131180" y="4396742"/>
+            <a:ext cx="7391400" cy="830997"/>
+          </a:xfrm>
+          <a:prstGeom prst="rect">
+            <a:avLst/>
+          </a:prstGeom>
+          <a:noFill/>
+        </p:spPr>
+        <p:txBody>
+          <a:bodyPr wrap="square" rtlCol="0">
+            <a:spAutoFit/>
+          </a:bodyPr>
+          <a:lstStyle/>
+          <a:p>
+            <a:pPr algn="just"/>
+            <a:r>
+              <a:rPr lang="en-US" sz="1200" dirty="0">
+                <a:latin typeface="Bahnschrift Light" panose="020B0502040204020203" pitchFamily="34" charset="0"/>
+              </a:rPr>
+              <a:t>I am a Mexican software developer that loves his career and dreams with having his own video game studio. I love altruism, development, videogames, writing, chess, soccer, computers and introspection. If you want to know more about my preparation, skills and experience, I suggest you </a:t>
+            </a:r>
+            <a:r>
+              <a:rPr lang="en-US" sz="1200" dirty="0" smtClean="0">
+                <a:latin typeface="Bahnschrift Light" panose="020B0502040204020203" pitchFamily="34" charset="0"/>
+              </a:rPr>
+              <a:t> to visit </a:t>
+            </a:r>
+            <a:r>
+              <a:rPr lang="en-US" sz="1200" dirty="0">
+                <a:latin typeface="Bahnschrift Light" panose="020B0502040204020203" pitchFamily="34" charset="0"/>
+              </a:rPr>
+              <a:t>my </a:t>
+            </a:r>
+            <a:r>
+              <a:rPr lang="en-US" sz="1200" dirty="0" err="1">
+                <a:latin typeface="Bahnschrift Light" panose="020B0502040204020203" pitchFamily="34" charset="0"/>
+              </a:rPr>
+              <a:t>linkedIn</a:t>
+            </a:r>
+            <a:r>
+              <a:rPr lang="en-US" sz="1200" dirty="0">
+                <a:latin typeface="Bahnschrift Light" panose="020B0502040204020203" pitchFamily="34" charset="0"/>
+              </a:rPr>
+              <a:t> which is a platform more focused to that aspect, this page is for my personal and continuous improvement.</a:t>
+            </a:r>
+            <a:endParaRPr lang="en-US" sz="1200" dirty="0">
+              <a:latin typeface="Bahnschrift Light" panose="020B0502040204020203" pitchFamily="34" charset="0"/>
+            </a:endParaRPr>
+          </a:p>
+        </p:txBody>
+      </p:sp>
     </p:spTree>
     <p:extLst>
       <p:ext uri="{BB962C8B-B14F-4D97-AF65-F5344CB8AC3E}">

</xml_diff>

<commit_message>
Screens modified, added phrases on the footer
</commit_message>
<xml_diff>
--- a/screens.pptx
+++ b/screens.pptx
@@ -1780,7 +1780,7 @@
         </p:nvCxnSpPr>
         <p:spPr>
           <a:xfrm>
-            <a:off x="0" y="5943600"/>
+            <a:off x="0" y="5955175"/>
             <a:ext cx="9144000" cy="0"/>
           </a:xfrm>
           <a:prstGeom prst="line">
@@ -1817,7 +1817,7 @@
         </p:nvSpPr>
         <p:spPr>
           <a:xfrm>
-            <a:off x="52300" y="6096000"/>
+            <a:off x="52300" y="5991925"/>
             <a:ext cx="5106911" cy="369332"/>
           </a:xfrm>
           <a:prstGeom prst="rect">
@@ -1927,7 +1927,7 @@
         </p:nvSpPr>
         <p:spPr>
           <a:xfrm>
-            <a:off x="76200" y="6379726"/>
+            <a:off x="76200" y="6275651"/>
             <a:ext cx="2238562" cy="276999"/>
           </a:xfrm>
           <a:prstGeom prst="rect">
@@ -1972,7 +1972,7 @@
         </p:blipFill>
         <p:spPr bwMode="auto">
           <a:xfrm>
-            <a:off x="8548984" y="6243499"/>
+            <a:off x="8548984" y="6086374"/>
             <a:ext cx="413226" cy="413226"/>
           </a:xfrm>
           <a:prstGeom prst="rect">
@@ -2013,7 +2013,7 @@
         </p:blipFill>
         <p:spPr bwMode="auto">
           <a:xfrm>
-            <a:off x="7913618" y="6243499"/>
+            <a:off x="7913618" y="6086374"/>
             <a:ext cx="528003" cy="464098"/>
           </a:xfrm>
           <a:prstGeom prst="rect">
@@ -2054,7 +2054,7 @@
         </p:blipFill>
         <p:spPr bwMode="auto">
           <a:xfrm>
-            <a:off x="7363077" y="6243499"/>
+            <a:off x="7363077" y="6086374"/>
             <a:ext cx="478401" cy="478401"/>
           </a:xfrm>
           <a:prstGeom prst="rect">
@@ -2113,6 +2113,82 @@
           </a:extLst>
         </p:spPr>
       </p:pic>
+      <p:sp>
+        <p:nvSpPr>
+          <p:cNvPr id="2" name="Rectangle 1"/>
+          <p:cNvSpPr/>
+          <p:nvPr userDrawn="1"/>
+        </p:nvSpPr>
+        <p:spPr>
+          <a:xfrm>
+            <a:off x="3756950" y="6564775"/>
+            <a:ext cx="5299042" cy="307777"/>
+          </a:xfrm>
+          <a:prstGeom prst="rect">
+            <a:avLst/>
+          </a:prstGeom>
+        </p:spPr>
+        <p:txBody>
+          <a:bodyPr wrap="square">
+            <a:spAutoFit/>
+          </a:bodyPr>
+          <a:lstStyle/>
+          <a:p>
+            <a:r>
+              <a:rPr lang="es-ES" sz="1400" dirty="0" smtClean="0">
+                <a:solidFill>
+                  <a:schemeClr val="tx1">
+                    <a:lumMod val="75000"/>
+                    <a:lumOff val="25000"/>
+                  </a:schemeClr>
+                </a:solidFill>
+              </a:rPr>
+              <a:t>“</a:t>
+            </a:r>
+            <a:r>
+              <a:rPr lang="es-ES" sz="1400" b="0" dirty="0" smtClean="0">
+                <a:solidFill>
+                  <a:schemeClr val="tx1">
+                    <a:lumMod val="75000"/>
+                    <a:lumOff val="25000"/>
+                  </a:schemeClr>
+                </a:solidFill>
+              </a:rPr>
+              <a:t>Más que mil palabras inútiles, vale una sola que otorgue paz.</a:t>
+            </a:r>
+            <a:r>
+              <a:rPr lang="es-ES" sz="1400" b="1" dirty="0" smtClean="0">
+                <a:solidFill>
+                  <a:schemeClr val="tx1">
+                    <a:lumMod val="75000"/>
+                    <a:lumOff val="25000"/>
+                  </a:schemeClr>
+                </a:solidFill>
+              </a:rPr>
+              <a:t>”</a:t>
+            </a:r>
+            <a:r>
+              <a:rPr lang="es-ES" sz="1400" dirty="0" smtClean="0">
+                <a:solidFill>
+                  <a:schemeClr val="tx1">
+                    <a:lumMod val="75000"/>
+                    <a:lumOff val="25000"/>
+                  </a:schemeClr>
+                </a:solidFill>
+              </a:rPr>
+              <a:t>  - Buda</a:t>
+            </a:r>
+            <a:endParaRPr lang="en-US" sz="1400" dirty="0">
+              <a:solidFill>
+                <a:schemeClr val="tx1">
+                  <a:lumMod val="75000"/>
+                  <a:lumOff val="25000"/>
+                </a:schemeClr>
+              </a:solidFill>
+            </a:endParaRPr>
+          </a:p>
+        </p:txBody>
+      </p:sp>
     </p:spTree>
     <p:extLst>
       <p:ext uri="{BB962C8B-B14F-4D97-AF65-F5344CB8AC3E}">
@@ -3399,36 +3475,6 @@
           </a:extLst>
         </p:spPr>
       </p:pic>
-      <p:sp>
-        <p:nvSpPr>
-          <p:cNvPr id="50" name="TextBox 49"/>
-          <p:cNvSpPr txBox="1"/>
-          <p:nvPr userDrawn="1"/>
-        </p:nvSpPr>
-        <p:spPr>
-          <a:xfrm>
-            <a:off x="4106098" y="285690"/>
-            <a:ext cx="1516441" cy="369332"/>
-          </a:xfrm>
-          <a:prstGeom prst="rect">
-            <a:avLst/>
-          </a:prstGeom>
-          <a:noFill/>
-        </p:spPr>
-        <p:txBody>
-          <a:bodyPr wrap="none" rtlCol="0">
-            <a:spAutoFit/>
-          </a:bodyPr>
-          <a:lstStyle/>
-          <a:p>
-            <a:r>
-              <a:rPr lang="en-US" i="1" dirty="0" smtClean="0"/>
-              <a:t>Simple is cool.</a:t>
-            </a:r>
-            <a:endParaRPr lang="en-US" i="1" dirty="0"/>
-          </a:p>
-        </p:txBody>
-      </p:sp>
       <p:grpSp>
         <p:nvGrpSpPr>
           <p:cNvPr id="51" name="Group 50"/>
@@ -4601,306 +4647,6 @@
           </p:txBody>
         </p:sp>
       </p:grpSp>
-      <p:cxnSp>
-        <p:nvCxnSpPr>
-          <p:cNvPr id="41" name="Straight Connector 40"/>
-          <p:cNvCxnSpPr/>
-          <p:nvPr userDrawn="1"/>
-        </p:nvCxnSpPr>
-        <p:spPr>
-          <a:xfrm>
-            <a:off x="0" y="5943600"/>
-            <a:ext cx="9144000" cy="0"/>
-          </a:xfrm>
-          <a:prstGeom prst="line">
-            <a:avLst/>
-          </a:prstGeom>
-          <a:ln>
-            <a:solidFill>
-              <a:schemeClr val="bg1">
-                <a:lumMod val="75000"/>
-              </a:schemeClr>
-            </a:solidFill>
-          </a:ln>
-        </p:spPr>
-        <p:style>
-          <a:lnRef idx="1">
-            <a:schemeClr val="accent1"/>
-          </a:lnRef>
-          <a:fillRef idx="0">
-            <a:schemeClr val="accent1"/>
-          </a:fillRef>
-          <a:effectRef idx="0">
-            <a:schemeClr val="accent1"/>
-          </a:effectRef>
-          <a:fontRef idx="minor">
-            <a:schemeClr val="tx1"/>
-          </a:fontRef>
-        </p:style>
-      </p:cxnSp>
-      <p:sp>
-        <p:nvSpPr>
-          <p:cNvPr id="42" name="TextBox 41"/>
-          <p:cNvSpPr txBox="1"/>
-          <p:nvPr userDrawn="1"/>
-        </p:nvSpPr>
-        <p:spPr>
-          <a:xfrm>
-            <a:off x="52300" y="6096000"/>
-            <a:ext cx="5106911" cy="369332"/>
-          </a:xfrm>
-          <a:prstGeom prst="rect">
-            <a:avLst/>
-          </a:prstGeom>
-          <a:noFill/>
-        </p:spPr>
-        <p:txBody>
-          <a:bodyPr wrap="none" rtlCol="0">
-            <a:spAutoFit/>
-          </a:bodyPr>
-          <a:lstStyle/>
-          <a:p>
-            <a:r>
-              <a:rPr lang="en-US" dirty="0" smtClean="0">
-                <a:solidFill>
-                  <a:schemeClr val="tx1">
-                    <a:lumMod val="75000"/>
-                    <a:lumOff val="25000"/>
-                  </a:schemeClr>
-                </a:solidFill>
-              </a:rPr>
-              <a:t>Osmar Briones 2018. </a:t>
-            </a:r>
-            <a:r>
-              <a:rPr lang="en-US" dirty="0" err="1" smtClean="0">
-                <a:solidFill>
-                  <a:schemeClr val="tx1">
-                    <a:lumMod val="75000"/>
-                    <a:lumOff val="25000"/>
-                  </a:schemeClr>
-                </a:solidFill>
-              </a:rPr>
-              <a:t>Todos</a:t>
-            </a:r>
-            <a:r>
-              <a:rPr lang="en-US" dirty="0" smtClean="0">
-                <a:solidFill>
-                  <a:schemeClr val="tx1">
-                    <a:lumMod val="75000"/>
-                    <a:lumOff val="25000"/>
-                  </a:schemeClr>
-                </a:solidFill>
-              </a:rPr>
-              <a:t> </a:t>
-            </a:r>
-            <a:r>
-              <a:rPr lang="en-US" dirty="0" err="1" smtClean="0">
-                <a:solidFill>
-                  <a:schemeClr val="tx1">
-                    <a:lumMod val="75000"/>
-                    <a:lumOff val="25000"/>
-                  </a:schemeClr>
-                </a:solidFill>
-              </a:rPr>
-              <a:t>los</a:t>
-            </a:r>
-            <a:r>
-              <a:rPr lang="en-US" dirty="0" smtClean="0">
-                <a:solidFill>
-                  <a:schemeClr val="tx1">
-                    <a:lumMod val="75000"/>
-                    <a:lumOff val="25000"/>
-                  </a:schemeClr>
-                </a:solidFill>
-              </a:rPr>
-              <a:t> derechos </a:t>
-            </a:r>
-            <a:r>
-              <a:rPr lang="en-US" dirty="0" err="1" smtClean="0">
-                <a:solidFill>
-                  <a:schemeClr val="tx1">
-                    <a:lumMod val="75000"/>
-                    <a:lumOff val="25000"/>
-                  </a:schemeClr>
-                </a:solidFill>
-              </a:rPr>
-              <a:t>reservados</a:t>
-            </a:r>
-            <a:r>
-              <a:rPr lang="en-US" dirty="0" smtClean="0">
-                <a:solidFill>
-                  <a:schemeClr val="tx1">
-                    <a:lumMod val="75000"/>
-                    <a:lumOff val="25000"/>
-                  </a:schemeClr>
-                </a:solidFill>
-              </a:rPr>
-              <a:t>.</a:t>
-            </a:r>
-            <a:endParaRPr lang="en-US" dirty="0">
-              <a:solidFill>
-                <a:schemeClr val="tx1">
-                  <a:lumMod val="75000"/>
-                  <a:lumOff val="25000"/>
-                </a:schemeClr>
-              </a:solidFill>
-            </a:endParaRPr>
-          </a:p>
-        </p:txBody>
-      </p:sp>
-      <p:sp>
-        <p:nvSpPr>
-          <p:cNvPr id="43" name="TextBox 42"/>
-          <p:cNvSpPr txBox="1"/>
-          <p:nvPr userDrawn="1"/>
-        </p:nvSpPr>
-        <p:spPr>
-          <a:xfrm>
-            <a:off x="76200" y="6379726"/>
-            <a:ext cx="2238562" cy="276999"/>
-          </a:xfrm>
-          <a:prstGeom prst="rect">
-            <a:avLst/>
-          </a:prstGeom>
-          <a:noFill/>
-        </p:spPr>
-        <p:txBody>
-          <a:bodyPr wrap="none" rtlCol="0">
-            <a:spAutoFit/>
-          </a:bodyPr>
-          <a:lstStyle/>
-          <a:p>
-            <a:r>
-              <a:rPr lang="en-US" sz="1200" u="sng" dirty="0" smtClean="0"/>
-              <a:t>Click here to see something nice.</a:t>
-            </a:r>
-            <a:endParaRPr lang="en-US" sz="1200" u="sng" dirty="0"/>
-          </a:p>
-        </p:txBody>
-      </p:sp>
-      <p:pic>
-        <p:nvPicPr>
-          <p:cNvPr id="44" name="Picture 2" descr="Resultado de imagen para linkedin logo"/>
-          <p:cNvPicPr>
-            <a:picLocks noChangeAspect="1" noChangeArrowheads="1"/>
-          </p:cNvPicPr>
-          <p:nvPr userDrawn="1"/>
-        </p:nvPicPr>
-        <p:blipFill>
-          <a:blip r:embed="rId2" cstate="print">
-            <a:extLst>
-              <a:ext uri="{28A0092B-C50C-407E-A947-70E740481C1C}">
-                <a14:useLocalDpi xmlns:a14="http://schemas.microsoft.com/office/drawing/2010/main" val="0"/>
-              </a:ext>
-            </a:extLst>
-          </a:blip>
-          <a:srcRect/>
-          <a:stretch>
-            <a:fillRect/>
-          </a:stretch>
-        </p:blipFill>
-        <p:spPr bwMode="auto">
-          <a:xfrm>
-            <a:off x="8548984" y="6243499"/>
-            <a:ext cx="413226" cy="413226"/>
-          </a:xfrm>
-          <a:prstGeom prst="rect">
-            <a:avLst/>
-          </a:prstGeom>
-          <a:noFill/>
-          <a:extLst>
-            <a:ext uri="{909E8E84-426E-40DD-AFC4-6F175D3DCCD1}">
-              <a14:hiddenFill xmlns:a14="http://schemas.microsoft.com/office/drawing/2010/main">
-                <a:solidFill>
-                  <a:srgbClr val="FFFFFF"/>
-                </a:solidFill>
-              </a14:hiddenFill>
-            </a:ext>
-          </a:extLst>
-        </p:spPr>
-      </p:pic>
-      <p:pic>
-        <p:nvPicPr>
-          <p:cNvPr id="45" name="Picture 8" descr="Resultado de imagen para twitter png"/>
-          <p:cNvPicPr>
-            <a:picLocks noChangeAspect="1" noChangeArrowheads="1"/>
-          </p:cNvPicPr>
-          <p:nvPr userDrawn="1"/>
-        </p:nvPicPr>
-        <p:blipFill>
-          <a:blip r:embed="rId3" cstate="print">
-            <a:extLst>
-              <a:ext uri="{28A0092B-C50C-407E-A947-70E740481C1C}">
-                <a14:useLocalDpi xmlns:a14="http://schemas.microsoft.com/office/drawing/2010/main" val="0"/>
-              </a:ext>
-            </a:extLst>
-          </a:blip>
-          <a:srcRect/>
-          <a:stretch>
-            <a:fillRect/>
-          </a:stretch>
-        </p:blipFill>
-        <p:spPr bwMode="auto">
-          <a:xfrm>
-            <a:off x="7913618" y="6243499"/>
-            <a:ext cx="528003" cy="464098"/>
-          </a:xfrm>
-          <a:prstGeom prst="rect">
-            <a:avLst/>
-          </a:prstGeom>
-          <a:noFill/>
-          <a:extLst>
-            <a:ext uri="{909E8E84-426E-40DD-AFC4-6F175D3DCCD1}">
-              <a14:hiddenFill xmlns:a14="http://schemas.microsoft.com/office/drawing/2010/main">
-                <a:solidFill>
-                  <a:srgbClr val="FFFFFF"/>
-                </a:solidFill>
-              </a14:hiddenFill>
-            </a:ext>
-          </a:extLst>
-        </p:spPr>
-      </p:pic>
-      <p:pic>
-        <p:nvPicPr>
-          <p:cNvPr id="46" name="Picture 10" descr="Resultado de imagen para facebook png"/>
-          <p:cNvPicPr>
-            <a:picLocks noChangeAspect="1" noChangeArrowheads="1"/>
-          </p:cNvPicPr>
-          <p:nvPr userDrawn="1"/>
-        </p:nvPicPr>
-        <p:blipFill>
-          <a:blip r:embed="rId4" cstate="print">
-            <a:extLst>
-              <a:ext uri="{28A0092B-C50C-407E-A947-70E740481C1C}">
-                <a14:useLocalDpi xmlns:a14="http://schemas.microsoft.com/office/drawing/2010/main" val="0"/>
-              </a:ext>
-            </a:extLst>
-          </a:blip>
-          <a:srcRect/>
-          <a:stretch>
-            <a:fillRect/>
-          </a:stretch>
-        </p:blipFill>
-        <p:spPr bwMode="auto">
-          <a:xfrm>
-            <a:off x="7363077" y="6243499"/>
-            <a:ext cx="478401" cy="478401"/>
-          </a:xfrm>
-          <a:prstGeom prst="rect">
-            <a:avLst/>
-          </a:prstGeom>
-          <a:noFill/>
-          <a:extLst>
-            <a:ext uri="{909E8E84-426E-40DD-AFC4-6F175D3DCCD1}">
-              <a14:hiddenFill xmlns:a14="http://schemas.microsoft.com/office/drawing/2010/main">
-                <a:solidFill>
-                  <a:srgbClr val="FFFFFF"/>
-                </a:solidFill>
-              </a14:hiddenFill>
-            </a:ext>
-          </a:extLst>
-        </p:spPr>
-      </p:pic>
       <p:sp>
         <p:nvSpPr>
           <p:cNvPr id="53" name="TextBox 52"/>
@@ -5213,7 +4959,7 @@
           <p:nvPr userDrawn="1"/>
         </p:nvPicPr>
         <p:blipFill>
-          <a:blip r:embed="rId5" cstate="print">
+          <a:blip r:embed="rId2" cstate="print">
             <a:extLst>
               <a:ext uri="{28A0092B-C50C-407E-A947-70E740481C1C}">
                 <a14:useLocalDpi xmlns:a14="http://schemas.microsoft.com/office/drawing/2010/main" val="0"/>
@@ -5475,16 +5221,53 @@
           </p:txBody>
         </p:sp>
       </p:grpSp>
+      <p:cxnSp>
+        <p:nvCxnSpPr>
+          <p:cNvPr id="47" name="Straight Connector 46"/>
+          <p:cNvCxnSpPr/>
+          <p:nvPr userDrawn="1"/>
+        </p:nvCxnSpPr>
+        <p:spPr>
+          <a:xfrm>
+            <a:off x="0" y="5955175"/>
+            <a:ext cx="9144000" cy="0"/>
+          </a:xfrm>
+          <a:prstGeom prst="line">
+            <a:avLst/>
+          </a:prstGeom>
+          <a:ln>
+            <a:solidFill>
+              <a:schemeClr val="bg1">
+                <a:lumMod val="75000"/>
+              </a:schemeClr>
+            </a:solidFill>
+          </a:ln>
+        </p:spPr>
+        <p:style>
+          <a:lnRef idx="1">
+            <a:schemeClr val="accent1"/>
+          </a:lnRef>
+          <a:fillRef idx="0">
+            <a:schemeClr val="accent1"/>
+          </a:fillRef>
+          <a:effectRef idx="0">
+            <a:schemeClr val="accent1"/>
+          </a:effectRef>
+          <a:fontRef idx="minor">
+            <a:schemeClr val="tx1"/>
+          </a:fontRef>
+        </p:style>
+      </p:cxnSp>
       <p:sp>
         <p:nvSpPr>
-          <p:cNvPr id="62" name="TextBox 61"/>
+          <p:cNvPr id="48" name="TextBox 47"/>
           <p:cNvSpPr txBox="1"/>
           <p:nvPr userDrawn="1"/>
         </p:nvSpPr>
         <p:spPr>
           <a:xfrm>
-            <a:off x="4106098" y="285690"/>
-            <a:ext cx="1516441" cy="369332"/>
+            <a:off x="52300" y="5991925"/>
+            <a:ext cx="5106911" cy="369332"/>
           </a:xfrm>
           <a:prstGeom prst="rect">
             <a:avLst/>
@@ -5498,10 +5281,319 @@
           <a:lstStyle/>
           <a:p>
             <a:r>
-              <a:rPr lang="en-US" i="1" dirty="0" smtClean="0"/>
-              <a:t>Simple is cool.</a:t>
+              <a:rPr lang="en-US" dirty="0" smtClean="0">
+                <a:solidFill>
+                  <a:schemeClr val="tx1">
+                    <a:lumMod val="75000"/>
+                    <a:lumOff val="25000"/>
+                  </a:schemeClr>
+                </a:solidFill>
+              </a:rPr>
+              <a:t>Osmar Briones 2018. </a:t>
             </a:r>
-            <a:endParaRPr lang="en-US" i="1" dirty="0"/>
+            <a:r>
+              <a:rPr lang="en-US" dirty="0" err="1" smtClean="0">
+                <a:solidFill>
+                  <a:schemeClr val="tx1">
+                    <a:lumMod val="75000"/>
+                    <a:lumOff val="25000"/>
+                  </a:schemeClr>
+                </a:solidFill>
+              </a:rPr>
+              <a:t>Todos</a:t>
+            </a:r>
+            <a:r>
+              <a:rPr lang="en-US" dirty="0" smtClean="0">
+                <a:solidFill>
+                  <a:schemeClr val="tx1">
+                    <a:lumMod val="75000"/>
+                    <a:lumOff val="25000"/>
+                  </a:schemeClr>
+                </a:solidFill>
+              </a:rPr>
+              <a:t> </a:t>
+            </a:r>
+            <a:r>
+              <a:rPr lang="en-US" dirty="0" err="1" smtClean="0">
+                <a:solidFill>
+                  <a:schemeClr val="tx1">
+                    <a:lumMod val="75000"/>
+                    <a:lumOff val="25000"/>
+                  </a:schemeClr>
+                </a:solidFill>
+              </a:rPr>
+              <a:t>los</a:t>
+            </a:r>
+            <a:r>
+              <a:rPr lang="en-US" dirty="0" smtClean="0">
+                <a:solidFill>
+                  <a:schemeClr val="tx1">
+                    <a:lumMod val="75000"/>
+                    <a:lumOff val="25000"/>
+                  </a:schemeClr>
+                </a:solidFill>
+              </a:rPr>
+              <a:t> derechos </a:t>
+            </a:r>
+            <a:r>
+              <a:rPr lang="en-US" dirty="0" err="1" smtClean="0">
+                <a:solidFill>
+                  <a:schemeClr val="tx1">
+                    <a:lumMod val="75000"/>
+                    <a:lumOff val="25000"/>
+                  </a:schemeClr>
+                </a:solidFill>
+              </a:rPr>
+              <a:t>reservados</a:t>
+            </a:r>
+            <a:r>
+              <a:rPr lang="en-US" dirty="0" smtClean="0">
+                <a:solidFill>
+                  <a:schemeClr val="tx1">
+                    <a:lumMod val="75000"/>
+                    <a:lumOff val="25000"/>
+                  </a:schemeClr>
+                </a:solidFill>
+              </a:rPr>
+              <a:t>.</a:t>
+            </a:r>
+            <a:endParaRPr lang="en-US" dirty="0">
+              <a:solidFill>
+                <a:schemeClr val="tx1">
+                  <a:lumMod val="75000"/>
+                  <a:lumOff val="25000"/>
+                </a:schemeClr>
+              </a:solidFill>
+            </a:endParaRPr>
+          </a:p>
+        </p:txBody>
+      </p:sp>
+      <p:sp>
+        <p:nvSpPr>
+          <p:cNvPr id="49" name="TextBox 48"/>
+          <p:cNvSpPr txBox="1"/>
+          <p:nvPr userDrawn="1"/>
+        </p:nvSpPr>
+        <p:spPr>
+          <a:xfrm>
+            <a:off x="76200" y="6275651"/>
+            <a:ext cx="2238562" cy="276999"/>
+          </a:xfrm>
+          <a:prstGeom prst="rect">
+            <a:avLst/>
+          </a:prstGeom>
+          <a:noFill/>
+        </p:spPr>
+        <p:txBody>
+          <a:bodyPr wrap="none" rtlCol="0">
+            <a:spAutoFit/>
+          </a:bodyPr>
+          <a:lstStyle/>
+          <a:p>
+            <a:r>
+              <a:rPr lang="en-US" sz="1200" u="sng" dirty="0" smtClean="0"/>
+              <a:t>Click here to see something nice.</a:t>
+            </a:r>
+            <a:endParaRPr lang="en-US" sz="1200" u="sng" dirty="0"/>
+          </a:p>
+        </p:txBody>
+      </p:sp>
+      <p:pic>
+        <p:nvPicPr>
+          <p:cNvPr id="50" name="Picture 2" descr="Resultado de imagen para linkedin logo"/>
+          <p:cNvPicPr>
+            <a:picLocks noChangeAspect="1" noChangeArrowheads="1"/>
+          </p:cNvPicPr>
+          <p:nvPr userDrawn="1"/>
+        </p:nvPicPr>
+        <p:blipFill>
+          <a:blip r:embed="rId3" cstate="print">
+            <a:extLst>
+              <a:ext uri="{28A0092B-C50C-407E-A947-70E740481C1C}">
+                <a14:useLocalDpi xmlns:a14="http://schemas.microsoft.com/office/drawing/2010/main" val="0"/>
+              </a:ext>
+            </a:extLst>
+          </a:blip>
+          <a:srcRect/>
+          <a:stretch>
+            <a:fillRect/>
+          </a:stretch>
+        </p:blipFill>
+        <p:spPr bwMode="auto">
+          <a:xfrm>
+            <a:off x="8548984" y="6086374"/>
+            <a:ext cx="413226" cy="413226"/>
+          </a:xfrm>
+          <a:prstGeom prst="rect">
+            <a:avLst/>
+          </a:prstGeom>
+          <a:noFill/>
+          <a:extLst>
+            <a:ext uri="{909E8E84-426E-40DD-AFC4-6F175D3DCCD1}">
+              <a14:hiddenFill xmlns:a14="http://schemas.microsoft.com/office/drawing/2010/main">
+                <a:solidFill>
+                  <a:srgbClr val="FFFFFF"/>
+                </a:solidFill>
+              </a14:hiddenFill>
+            </a:ext>
+          </a:extLst>
+        </p:spPr>
+      </p:pic>
+      <p:pic>
+        <p:nvPicPr>
+          <p:cNvPr id="51" name="Picture 8" descr="Resultado de imagen para twitter png"/>
+          <p:cNvPicPr>
+            <a:picLocks noChangeAspect="1" noChangeArrowheads="1"/>
+          </p:cNvPicPr>
+          <p:nvPr userDrawn="1"/>
+        </p:nvPicPr>
+        <p:blipFill>
+          <a:blip r:embed="rId4" cstate="print">
+            <a:extLst>
+              <a:ext uri="{28A0092B-C50C-407E-A947-70E740481C1C}">
+                <a14:useLocalDpi xmlns:a14="http://schemas.microsoft.com/office/drawing/2010/main" val="0"/>
+              </a:ext>
+            </a:extLst>
+          </a:blip>
+          <a:srcRect/>
+          <a:stretch>
+            <a:fillRect/>
+          </a:stretch>
+        </p:blipFill>
+        <p:spPr bwMode="auto">
+          <a:xfrm>
+            <a:off x="7913618" y="6086374"/>
+            <a:ext cx="528003" cy="464098"/>
+          </a:xfrm>
+          <a:prstGeom prst="rect">
+            <a:avLst/>
+          </a:prstGeom>
+          <a:noFill/>
+          <a:extLst>
+            <a:ext uri="{909E8E84-426E-40DD-AFC4-6F175D3DCCD1}">
+              <a14:hiddenFill xmlns:a14="http://schemas.microsoft.com/office/drawing/2010/main">
+                <a:solidFill>
+                  <a:srgbClr val="FFFFFF"/>
+                </a:solidFill>
+              </a14:hiddenFill>
+            </a:ext>
+          </a:extLst>
+        </p:spPr>
+      </p:pic>
+      <p:pic>
+        <p:nvPicPr>
+          <p:cNvPr id="52" name="Picture 10" descr="Resultado de imagen para facebook png"/>
+          <p:cNvPicPr>
+            <a:picLocks noChangeAspect="1" noChangeArrowheads="1"/>
+          </p:cNvPicPr>
+          <p:nvPr userDrawn="1"/>
+        </p:nvPicPr>
+        <p:blipFill>
+          <a:blip r:embed="rId5" cstate="print">
+            <a:extLst>
+              <a:ext uri="{28A0092B-C50C-407E-A947-70E740481C1C}">
+                <a14:useLocalDpi xmlns:a14="http://schemas.microsoft.com/office/drawing/2010/main" val="0"/>
+              </a:ext>
+            </a:extLst>
+          </a:blip>
+          <a:srcRect/>
+          <a:stretch>
+            <a:fillRect/>
+          </a:stretch>
+        </p:blipFill>
+        <p:spPr bwMode="auto">
+          <a:xfrm>
+            <a:off x="7363077" y="6086374"/>
+            <a:ext cx="478401" cy="478401"/>
+          </a:xfrm>
+          <a:prstGeom prst="rect">
+            <a:avLst/>
+          </a:prstGeom>
+          <a:noFill/>
+          <a:extLst>
+            <a:ext uri="{909E8E84-426E-40DD-AFC4-6F175D3DCCD1}">
+              <a14:hiddenFill xmlns:a14="http://schemas.microsoft.com/office/drawing/2010/main">
+                <a:solidFill>
+                  <a:srgbClr val="FFFFFF"/>
+                </a:solidFill>
+              </a14:hiddenFill>
+            </a:ext>
+          </a:extLst>
+        </p:spPr>
+      </p:pic>
+      <p:sp>
+        <p:nvSpPr>
+          <p:cNvPr id="63" name="Rectangle 62"/>
+          <p:cNvSpPr/>
+          <p:nvPr userDrawn="1"/>
+        </p:nvSpPr>
+        <p:spPr>
+          <a:xfrm>
+            <a:off x="3756950" y="6564775"/>
+            <a:ext cx="5299042" cy="307777"/>
+          </a:xfrm>
+          <a:prstGeom prst="rect">
+            <a:avLst/>
+          </a:prstGeom>
+        </p:spPr>
+        <p:txBody>
+          <a:bodyPr wrap="square">
+            <a:spAutoFit/>
+          </a:bodyPr>
+          <a:lstStyle/>
+          <a:p>
+            <a:r>
+              <a:rPr lang="es-ES" sz="1400" dirty="0" smtClean="0">
+                <a:solidFill>
+                  <a:schemeClr val="tx1">
+                    <a:lumMod val="75000"/>
+                    <a:lumOff val="25000"/>
+                  </a:schemeClr>
+                </a:solidFill>
+              </a:rPr>
+              <a:t>“</a:t>
+            </a:r>
+            <a:r>
+              <a:rPr lang="es-ES" sz="1400" b="0" dirty="0" smtClean="0">
+                <a:solidFill>
+                  <a:schemeClr val="tx1">
+                    <a:lumMod val="75000"/>
+                    <a:lumOff val="25000"/>
+                  </a:schemeClr>
+                </a:solidFill>
+              </a:rPr>
+              <a:t>Más que mil palabras inútiles, vale una sola que otorgue paz.</a:t>
+            </a:r>
+            <a:r>
+              <a:rPr lang="es-ES" sz="1400" b="1" dirty="0" smtClean="0">
+                <a:solidFill>
+                  <a:schemeClr val="tx1">
+                    <a:lumMod val="75000"/>
+                    <a:lumOff val="25000"/>
+                  </a:schemeClr>
+                </a:solidFill>
+              </a:rPr>
+              <a:t>”</a:t>
+            </a:r>
+            <a:r>
+              <a:rPr lang="es-ES" sz="1400" dirty="0" smtClean="0">
+                <a:solidFill>
+                  <a:schemeClr val="tx1">
+                    <a:lumMod val="75000"/>
+                    <a:lumOff val="25000"/>
+                  </a:schemeClr>
+                </a:solidFill>
+              </a:rPr>
+              <a:t>  - Buda</a:t>
+            </a:r>
+            <a:endParaRPr lang="en-US" sz="1400" dirty="0">
+              <a:solidFill>
+                <a:schemeClr val="tx1">
+                  <a:lumMod val="75000"/>
+                  <a:lumOff val="25000"/>
+                </a:schemeClr>
+              </a:solidFill>
+            </a:endParaRPr>
           </a:p>
         </p:txBody>
       </p:sp>
@@ -6791,36 +6883,6 @@
           </a:extLst>
         </p:spPr>
       </p:pic>
-      <p:sp>
-        <p:nvSpPr>
-          <p:cNvPr id="50" name="TextBox 49"/>
-          <p:cNvSpPr txBox="1"/>
-          <p:nvPr userDrawn="1"/>
-        </p:nvSpPr>
-        <p:spPr>
-          <a:xfrm>
-            <a:off x="4106098" y="285690"/>
-            <a:ext cx="1516441" cy="369332"/>
-          </a:xfrm>
-          <a:prstGeom prst="rect">
-            <a:avLst/>
-          </a:prstGeom>
-          <a:noFill/>
-        </p:spPr>
-        <p:txBody>
-          <a:bodyPr wrap="none" rtlCol="0">
-            <a:spAutoFit/>
-          </a:bodyPr>
-          <a:lstStyle/>
-          <a:p>
-            <a:r>
-              <a:rPr lang="en-US" i="1" dirty="0" smtClean="0"/>
-              <a:t>Simple is cool.</a:t>
-            </a:r>
-            <a:endParaRPr lang="en-US" i="1" dirty="0"/>
-          </a:p>
-        </p:txBody>
-      </p:sp>
       <p:grpSp>
         <p:nvGrpSpPr>
           <p:cNvPr id="51" name="Group 50"/>
@@ -7993,306 +8055,6 @@
           </p:txBody>
         </p:sp>
       </p:grpSp>
-      <p:cxnSp>
-        <p:nvCxnSpPr>
-          <p:cNvPr id="41" name="Straight Connector 40"/>
-          <p:cNvCxnSpPr/>
-          <p:nvPr userDrawn="1"/>
-        </p:nvCxnSpPr>
-        <p:spPr>
-          <a:xfrm>
-            <a:off x="0" y="5943600"/>
-            <a:ext cx="9144000" cy="0"/>
-          </a:xfrm>
-          <a:prstGeom prst="line">
-            <a:avLst/>
-          </a:prstGeom>
-          <a:ln>
-            <a:solidFill>
-              <a:schemeClr val="bg1">
-                <a:lumMod val="75000"/>
-              </a:schemeClr>
-            </a:solidFill>
-          </a:ln>
-        </p:spPr>
-        <p:style>
-          <a:lnRef idx="1">
-            <a:schemeClr val="accent1"/>
-          </a:lnRef>
-          <a:fillRef idx="0">
-            <a:schemeClr val="accent1"/>
-          </a:fillRef>
-          <a:effectRef idx="0">
-            <a:schemeClr val="accent1"/>
-          </a:effectRef>
-          <a:fontRef idx="minor">
-            <a:schemeClr val="tx1"/>
-          </a:fontRef>
-        </p:style>
-      </p:cxnSp>
-      <p:sp>
-        <p:nvSpPr>
-          <p:cNvPr id="42" name="TextBox 41"/>
-          <p:cNvSpPr txBox="1"/>
-          <p:nvPr userDrawn="1"/>
-        </p:nvSpPr>
-        <p:spPr>
-          <a:xfrm>
-            <a:off x="52300" y="6096000"/>
-            <a:ext cx="5106911" cy="369332"/>
-          </a:xfrm>
-          <a:prstGeom prst="rect">
-            <a:avLst/>
-          </a:prstGeom>
-          <a:noFill/>
-        </p:spPr>
-        <p:txBody>
-          <a:bodyPr wrap="none" rtlCol="0">
-            <a:spAutoFit/>
-          </a:bodyPr>
-          <a:lstStyle/>
-          <a:p>
-            <a:r>
-              <a:rPr lang="en-US" dirty="0" smtClean="0">
-                <a:solidFill>
-                  <a:schemeClr val="tx1">
-                    <a:lumMod val="75000"/>
-                    <a:lumOff val="25000"/>
-                  </a:schemeClr>
-                </a:solidFill>
-              </a:rPr>
-              <a:t>Osmar Briones 2018. </a:t>
-            </a:r>
-            <a:r>
-              <a:rPr lang="en-US" dirty="0" err="1" smtClean="0">
-                <a:solidFill>
-                  <a:schemeClr val="tx1">
-                    <a:lumMod val="75000"/>
-                    <a:lumOff val="25000"/>
-                  </a:schemeClr>
-                </a:solidFill>
-              </a:rPr>
-              <a:t>Todos</a:t>
-            </a:r>
-            <a:r>
-              <a:rPr lang="en-US" dirty="0" smtClean="0">
-                <a:solidFill>
-                  <a:schemeClr val="tx1">
-                    <a:lumMod val="75000"/>
-                    <a:lumOff val="25000"/>
-                  </a:schemeClr>
-                </a:solidFill>
-              </a:rPr>
-              <a:t> </a:t>
-            </a:r>
-            <a:r>
-              <a:rPr lang="en-US" dirty="0" err="1" smtClean="0">
-                <a:solidFill>
-                  <a:schemeClr val="tx1">
-                    <a:lumMod val="75000"/>
-                    <a:lumOff val="25000"/>
-                  </a:schemeClr>
-                </a:solidFill>
-              </a:rPr>
-              <a:t>los</a:t>
-            </a:r>
-            <a:r>
-              <a:rPr lang="en-US" dirty="0" smtClean="0">
-                <a:solidFill>
-                  <a:schemeClr val="tx1">
-                    <a:lumMod val="75000"/>
-                    <a:lumOff val="25000"/>
-                  </a:schemeClr>
-                </a:solidFill>
-              </a:rPr>
-              <a:t> derechos </a:t>
-            </a:r>
-            <a:r>
-              <a:rPr lang="en-US" dirty="0" err="1" smtClean="0">
-                <a:solidFill>
-                  <a:schemeClr val="tx1">
-                    <a:lumMod val="75000"/>
-                    <a:lumOff val="25000"/>
-                  </a:schemeClr>
-                </a:solidFill>
-              </a:rPr>
-              <a:t>reservados</a:t>
-            </a:r>
-            <a:r>
-              <a:rPr lang="en-US" dirty="0" smtClean="0">
-                <a:solidFill>
-                  <a:schemeClr val="tx1">
-                    <a:lumMod val="75000"/>
-                    <a:lumOff val="25000"/>
-                  </a:schemeClr>
-                </a:solidFill>
-              </a:rPr>
-              <a:t>.</a:t>
-            </a:r>
-            <a:endParaRPr lang="en-US" dirty="0">
-              <a:solidFill>
-                <a:schemeClr val="tx1">
-                  <a:lumMod val="75000"/>
-                  <a:lumOff val="25000"/>
-                </a:schemeClr>
-              </a:solidFill>
-            </a:endParaRPr>
-          </a:p>
-        </p:txBody>
-      </p:sp>
-      <p:sp>
-        <p:nvSpPr>
-          <p:cNvPr id="43" name="TextBox 42"/>
-          <p:cNvSpPr txBox="1"/>
-          <p:nvPr userDrawn="1"/>
-        </p:nvSpPr>
-        <p:spPr>
-          <a:xfrm>
-            <a:off x="76200" y="6379726"/>
-            <a:ext cx="2238562" cy="276999"/>
-          </a:xfrm>
-          <a:prstGeom prst="rect">
-            <a:avLst/>
-          </a:prstGeom>
-          <a:noFill/>
-        </p:spPr>
-        <p:txBody>
-          <a:bodyPr wrap="none" rtlCol="0">
-            <a:spAutoFit/>
-          </a:bodyPr>
-          <a:lstStyle/>
-          <a:p>
-            <a:r>
-              <a:rPr lang="en-US" sz="1200" u="sng" dirty="0" smtClean="0"/>
-              <a:t>Click here to see something nice.</a:t>
-            </a:r>
-            <a:endParaRPr lang="en-US" sz="1200" u="sng" dirty="0"/>
-          </a:p>
-        </p:txBody>
-      </p:sp>
-      <p:pic>
-        <p:nvPicPr>
-          <p:cNvPr id="44" name="Picture 2" descr="Resultado de imagen para linkedin logo"/>
-          <p:cNvPicPr>
-            <a:picLocks noChangeAspect="1" noChangeArrowheads="1"/>
-          </p:cNvPicPr>
-          <p:nvPr userDrawn="1"/>
-        </p:nvPicPr>
-        <p:blipFill>
-          <a:blip r:embed="rId2" cstate="print">
-            <a:extLst>
-              <a:ext uri="{28A0092B-C50C-407E-A947-70E740481C1C}">
-                <a14:useLocalDpi xmlns:a14="http://schemas.microsoft.com/office/drawing/2010/main" val="0"/>
-              </a:ext>
-            </a:extLst>
-          </a:blip>
-          <a:srcRect/>
-          <a:stretch>
-            <a:fillRect/>
-          </a:stretch>
-        </p:blipFill>
-        <p:spPr bwMode="auto">
-          <a:xfrm>
-            <a:off x="8548984" y="6243499"/>
-            <a:ext cx="413226" cy="413226"/>
-          </a:xfrm>
-          <a:prstGeom prst="rect">
-            <a:avLst/>
-          </a:prstGeom>
-          <a:noFill/>
-          <a:extLst>
-            <a:ext uri="{909E8E84-426E-40DD-AFC4-6F175D3DCCD1}">
-              <a14:hiddenFill xmlns:a14="http://schemas.microsoft.com/office/drawing/2010/main">
-                <a:solidFill>
-                  <a:srgbClr val="FFFFFF"/>
-                </a:solidFill>
-              </a14:hiddenFill>
-            </a:ext>
-          </a:extLst>
-        </p:spPr>
-      </p:pic>
-      <p:pic>
-        <p:nvPicPr>
-          <p:cNvPr id="45" name="Picture 8" descr="Resultado de imagen para twitter png"/>
-          <p:cNvPicPr>
-            <a:picLocks noChangeAspect="1" noChangeArrowheads="1"/>
-          </p:cNvPicPr>
-          <p:nvPr userDrawn="1"/>
-        </p:nvPicPr>
-        <p:blipFill>
-          <a:blip r:embed="rId3" cstate="print">
-            <a:extLst>
-              <a:ext uri="{28A0092B-C50C-407E-A947-70E740481C1C}">
-                <a14:useLocalDpi xmlns:a14="http://schemas.microsoft.com/office/drawing/2010/main" val="0"/>
-              </a:ext>
-            </a:extLst>
-          </a:blip>
-          <a:srcRect/>
-          <a:stretch>
-            <a:fillRect/>
-          </a:stretch>
-        </p:blipFill>
-        <p:spPr bwMode="auto">
-          <a:xfrm>
-            <a:off x="7913618" y="6243499"/>
-            <a:ext cx="528003" cy="464098"/>
-          </a:xfrm>
-          <a:prstGeom prst="rect">
-            <a:avLst/>
-          </a:prstGeom>
-          <a:noFill/>
-          <a:extLst>
-            <a:ext uri="{909E8E84-426E-40DD-AFC4-6F175D3DCCD1}">
-              <a14:hiddenFill xmlns:a14="http://schemas.microsoft.com/office/drawing/2010/main">
-                <a:solidFill>
-                  <a:srgbClr val="FFFFFF"/>
-                </a:solidFill>
-              </a14:hiddenFill>
-            </a:ext>
-          </a:extLst>
-        </p:spPr>
-      </p:pic>
-      <p:pic>
-        <p:nvPicPr>
-          <p:cNvPr id="46" name="Picture 10" descr="Resultado de imagen para facebook png"/>
-          <p:cNvPicPr>
-            <a:picLocks noChangeAspect="1" noChangeArrowheads="1"/>
-          </p:cNvPicPr>
-          <p:nvPr userDrawn="1"/>
-        </p:nvPicPr>
-        <p:blipFill>
-          <a:blip r:embed="rId4" cstate="print">
-            <a:extLst>
-              <a:ext uri="{28A0092B-C50C-407E-A947-70E740481C1C}">
-                <a14:useLocalDpi xmlns:a14="http://schemas.microsoft.com/office/drawing/2010/main" val="0"/>
-              </a:ext>
-            </a:extLst>
-          </a:blip>
-          <a:srcRect/>
-          <a:stretch>
-            <a:fillRect/>
-          </a:stretch>
-        </p:blipFill>
-        <p:spPr bwMode="auto">
-          <a:xfrm>
-            <a:off x="7363077" y="6243499"/>
-            <a:ext cx="478401" cy="478401"/>
-          </a:xfrm>
-          <a:prstGeom prst="rect">
-            <a:avLst/>
-          </a:prstGeom>
-          <a:noFill/>
-          <a:extLst>
-            <a:ext uri="{909E8E84-426E-40DD-AFC4-6F175D3DCCD1}">
-              <a14:hiddenFill xmlns:a14="http://schemas.microsoft.com/office/drawing/2010/main">
-                <a:solidFill>
-                  <a:srgbClr val="FFFFFF"/>
-                </a:solidFill>
-              </a14:hiddenFill>
-            </a:ext>
-          </a:extLst>
-        </p:spPr>
-      </p:pic>
       <p:sp>
         <p:nvSpPr>
           <p:cNvPr id="53" name="TextBox 52"/>
@@ -8605,7 +8367,7 @@
           <p:nvPr userDrawn="1"/>
         </p:nvPicPr>
         <p:blipFill>
-          <a:blip r:embed="rId5" cstate="print">
+          <a:blip r:embed="rId2" cstate="print">
             <a:extLst>
               <a:ext uri="{28A0092B-C50C-407E-A947-70E740481C1C}">
                 <a14:useLocalDpi xmlns:a14="http://schemas.microsoft.com/office/drawing/2010/main" val="0"/>
@@ -8867,16 +8629,53 @@
           </p:txBody>
         </p:sp>
       </p:grpSp>
+      <p:cxnSp>
+        <p:nvCxnSpPr>
+          <p:cNvPr id="47" name="Straight Connector 46"/>
+          <p:cNvCxnSpPr/>
+          <p:nvPr userDrawn="1"/>
+        </p:nvCxnSpPr>
+        <p:spPr>
+          <a:xfrm>
+            <a:off x="0" y="5955175"/>
+            <a:ext cx="9144000" cy="0"/>
+          </a:xfrm>
+          <a:prstGeom prst="line">
+            <a:avLst/>
+          </a:prstGeom>
+          <a:ln>
+            <a:solidFill>
+              <a:schemeClr val="bg1">
+                <a:lumMod val="75000"/>
+              </a:schemeClr>
+            </a:solidFill>
+          </a:ln>
+        </p:spPr>
+        <p:style>
+          <a:lnRef idx="1">
+            <a:schemeClr val="accent1"/>
+          </a:lnRef>
+          <a:fillRef idx="0">
+            <a:schemeClr val="accent1"/>
+          </a:fillRef>
+          <a:effectRef idx="0">
+            <a:schemeClr val="accent1"/>
+          </a:effectRef>
+          <a:fontRef idx="minor">
+            <a:schemeClr val="tx1"/>
+          </a:fontRef>
+        </p:style>
+      </p:cxnSp>
       <p:sp>
         <p:nvSpPr>
-          <p:cNvPr id="62" name="TextBox 61"/>
+          <p:cNvPr id="48" name="TextBox 47"/>
           <p:cNvSpPr txBox="1"/>
           <p:nvPr userDrawn="1"/>
         </p:nvSpPr>
         <p:spPr>
           <a:xfrm>
-            <a:off x="4106098" y="285690"/>
-            <a:ext cx="1516441" cy="369332"/>
+            <a:off x="52300" y="5991925"/>
+            <a:ext cx="5106911" cy="369332"/>
           </a:xfrm>
           <a:prstGeom prst="rect">
             <a:avLst/>
@@ -8890,10 +8689,319 @@
           <a:lstStyle/>
           <a:p>
             <a:r>
-              <a:rPr lang="en-US" i="1" dirty="0" smtClean="0"/>
-              <a:t>Simple is cool.</a:t>
+              <a:rPr lang="en-US" dirty="0" smtClean="0">
+                <a:solidFill>
+                  <a:schemeClr val="tx1">
+                    <a:lumMod val="75000"/>
+                    <a:lumOff val="25000"/>
+                  </a:schemeClr>
+                </a:solidFill>
+              </a:rPr>
+              <a:t>Osmar Briones 2018. </a:t>
             </a:r>
-            <a:endParaRPr lang="en-US" i="1" dirty="0"/>
+            <a:r>
+              <a:rPr lang="en-US" dirty="0" err="1" smtClean="0">
+                <a:solidFill>
+                  <a:schemeClr val="tx1">
+                    <a:lumMod val="75000"/>
+                    <a:lumOff val="25000"/>
+                  </a:schemeClr>
+                </a:solidFill>
+              </a:rPr>
+              <a:t>Todos</a:t>
+            </a:r>
+            <a:r>
+              <a:rPr lang="en-US" dirty="0" smtClean="0">
+                <a:solidFill>
+                  <a:schemeClr val="tx1">
+                    <a:lumMod val="75000"/>
+                    <a:lumOff val="25000"/>
+                  </a:schemeClr>
+                </a:solidFill>
+              </a:rPr>
+              <a:t> </a:t>
+            </a:r>
+            <a:r>
+              <a:rPr lang="en-US" dirty="0" err="1" smtClean="0">
+                <a:solidFill>
+                  <a:schemeClr val="tx1">
+                    <a:lumMod val="75000"/>
+                    <a:lumOff val="25000"/>
+                  </a:schemeClr>
+                </a:solidFill>
+              </a:rPr>
+              <a:t>los</a:t>
+            </a:r>
+            <a:r>
+              <a:rPr lang="en-US" dirty="0" smtClean="0">
+                <a:solidFill>
+                  <a:schemeClr val="tx1">
+                    <a:lumMod val="75000"/>
+                    <a:lumOff val="25000"/>
+                  </a:schemeClr>
+                </a:solidFill>
+              </a:rPr>
+              <a:t> derechos </a:t>
+            </a:r>
+            <a:r>
+              <a:rPr lang="en-US" dirty="0" err="1" smtClean="0">
+                <a:solidFill>
+                  <a:schemeClr val="tx1">
+                    <a:lumMod val="75000"/>
+                    <a:lumOff val="25000"/>
+                  </a:schemeClr>
+                </a:solidFill>
+              </a:rPr>
+              <a:t>reservados</a:t>
+            </a:r>
+            <a:r>
+              <a:rPr lang="en-US" dirty="0" smtClean="0">
+                <a:solidFill>
+                  <a:schemeClr val="tx1">
+                    <a:lumMod val="75000"/>
+                    <a:lumOff val="25000"/>
+                  </a:schemeClr>
+                </a:solidFill>
+              </a:rPr>
+              <a:t>.</a:t>
+            </a:r>
+            <a:endParaRPr lang="en-US" dirty="0">
+              <a:solidFill>
+                <a:schemeClr val="tx1">
+                  <a:lumMod val="75000"/>
+                  <a:lumOff val="25000"/>
+                </a:schemeClr>
+              </a:solidFill>
+            </a:endParaRPr>
+          </a:p>
+        </p:txBody>
+      </p:sp>
+      <p:sp>
+        <p:nvSpPr>
+          <p:cNvPr id="49" name="TextBox 48"/>
+          <p:cNvSpPr txBox="1"/>
+          <p:nvPr userDrawn="1"/>
+        </p:nvSpPr>
+        <p:spPr>
+          <a:xfrm>
+            <a:off x="76200" y="6275651"/>
+            <a:ext cx="2238562" cy="276999"/>
+          </a:xfrm>
+          <a:prstGeom prst="rect">
+            <a:avLst/>
+          </a:prstGeom>
+          <a:noFill/>
+        </p:spPr>
+        <p:txBody>
+          <a:bodyPr wrap="none" rtlCol="0">
+            <a:spAutoFit/>
+          </a:bodyPr>
+          <a:lstStyle/>
+          <a:p>
+            <a:r>
+              <a:rPr lang="en-US" sz="1200" u="sng" dirty="0" smtClean="0"/>
+              <a:t>Click here to see something nice.</a:t>
+            </a:r>
+            <a:endParaRPr lang="en-US" sz="1200" u="sng" dirty="0"/>
+          </a:p>
+        </p:txBody>
+      </p:sp>
+      <p:pic>
+        <p:nvPicPr>
+          <p:cNvPr id="50" name="Picture 2" descr="Resultado de imagen para linkedin logo"/>
+          <p:cNvPicPr>
+            <a:picLocks noChangeAspect="1" noChangeArrowheads="1"/>
+          </p:cNvPicPr>
+          <p:nvPr userDrawn="1"/>
+        </p:nvPicPr>
+        <p:blipFill>
+          <a:blip r:embed="rId3" cstate="print">
+            <a:extLst>
+              <a:ext uri="{28A0092B-C50C-407E-A947-70E740481C1C}">
+                <a14:useLocalDpi xmlns:a14="http://schemas.microsoft.com/office/drawing/2010/main" val="0"/>
+              </a:ext>
+            </a:extLst>
+          </a:blip>
+          <a:srcRect/>
+          <a:stretch>
+            <a:fillRect/>
+          </a:stretch>
+        </p:blipFill>
+        <p:spPr bwMode="auto">
+          <a:xfrm>
+            <a:off x="8548984" y="6086374"/>
+            <a:ext cx="413226" cy="413226"/>
+          </a:xfrm>
+          <a:prstGeom prst="rect">
+            <a:avLst/>
+          </a:prstGeom>
+          <a:noFill/>
+          <a:extLst>
+            <a:ext uri="{909E8E84-426E-40DD-AFC4-6F175D3DCCD1}">
+              <a14:hiddenFill xmlns:a14="http://schemas.microsoft.com/office/drawing/2010/main">
+                <a:solidFill>
+                  <a:srgbClr val="FFFFFF"/>
+                </a:solidFill>
+              </a14:hiddenFill>
+            </a:ext>
+          </a:extLst>
+        </p:spPr>
+      </p:pic>
+      <p:pic>
+        <p:nvPicPr>
+          <p:cNvPr id="51" name="Picture 8" descr="Resultado de imagen para twitter png"/>
+          <p:cNvPicPr>
+            <a:picLocks noChangeAspect="1" noChangeArrowheads="1"/>
+          </p:cNvPicPr>
+          <p:nvPr userDrawn="1"/>
+        </p:nvPicPr>
+        <p:blipFill>
+          <a:blip r:embed="rId4" cstate="print">
+            <a:extLst>
+              <a:ext uri="{28A0092B-C50C-407E-A947-70E740481C1C}">
+                <a14:useLocalDpi xmlns:a14="http://schemas.microsoft.com/office/drawing/2010/main" val="0"/>
+              </a:ext>
+            </a:extLst>
+          </a:blip>
+          <a:srcRect/>
+          <a:stretch>
+            <a:fillRect/>
+          </a:stretch>
+        </p:blipFill>
+        <p:spPr bwMode="auto">
+          <a:xfrm>
+            <a:off x="7913618" y="6086374"/>
+            <a:ext cx="528003" cy="464098"/>
+          </a:xfrm>
+          <a:prstGeom prst="rect">
+            <a:avLst/>
+          </a:prstGeom>
+          <a:noFill/>
+          <a:extLst>
+            <a:ext uri="{909E8E84-426E-40DD-AFC4-6F175D3DCCD1}">
+              <a14:hiddenFill xmlns:a14="http://schemas.microsoft.com/office/drawing/2010/main">
+                <a:solidFill>
+                  <a:srgbClr val="FFFFFF"/>
+                </a:solidFill>
+              </a14:hiddenFill>
+            </a:ext>
+          </a:extLst>
+        </p:spPr>
+      </p:pic>
+      <p:pic>
+        <p:nvPicPr>
+          <p:cNvPr id="52" name="Picture 10" descr="Resultado de imagen para facebook png"/>
+          <p:cNvPicPr>
+            <a:picLocks noChangeAspect="1" noChangeArrowheads="1"/>
+          </p:cNvPicPr>
+          <p:nvPr userDrawn="1"/>
+        </p:nvPicPr>
+        <p:blipFill>
+          <a:blip r:embed="rId5" cstate="print">
+            <a:extLst>
+              <a:ext uri="{28A0092B-C50C-407E-A947-70E740481C1C}">
+                <a14:useLocalDpi xmlns:a14="http://schemas.microsoft.com/office/drawing/2010/main" val="0"/>
+              </a:ext>
+            </a:extLst>
+          </a:blip>
+          <a:srcRect/>
+          <a:stretch>
+            <a:fillRect/>
+          </a:stretch>
+        </p:blipFill>
+        <p:spPr bwMode="auto">
+          <a:xfrm>
+            <a:off x="7363077" y="6086374"/>
+            <a:ext cx="478401" cy="478401"/>
+          </a:xfrm>
+          <a:prstGeom prst="rect">
+            <a:avLst/>
+          </a:prstGeom>
+          <a:noFill/>
+          <a:extLst>
+            <a:ext uri="{909E8E84-426E-40DD-AFC4-6F175D3DCCD1}">
+              <a14:hiddenFill xmlns:a14="http://schemas.microsoft.com/office/drawing/2010/main">
+                <a:solidFill>
+                  <a:srgbClr val="FFFFFF"/>
+                </a:solidFill>
+              </a14:hiddenFill>
+            </a:ext>
+          </a:extLst>
+        </p:spPr>
+      </p:pic>
+      <p:sp>
+        <p:nvSpPr>
+          <p:cNvPr id="63" name="Rectangle 62"/>
+          <p:cNvSpPr/>
+          <p:nvPr userDrawn="1"/>
+        </p:nvSpPr>
+        <p:spPr>
+          <a:xfrm>
+            <a:off x="3756950" y="6564775"/>
+            <a:ext cx="5299042" cy="307777"/>
+          </a:xfrm>
+          <a:prstGeom prst="rect">
+            <a:avLst/>
+          </a:prstGeom>
+        </p:spPr>
+        <p:txBody>
+          <a:bodyPr wrap="square">
+            <a:spAutoFit/>
+          </a:bodyPr>
+          <a:lstStyle/>
+          <a:p>
+            <a:r>
+              <a:rPr lang="es-ES" sz="1400" dirty="0" smtClean="0">
+                <a:solidFill>
+                  <a:schemeClr val="tx1">
+                    <a:lumMod val="75000"/>
+                    <a:lumOff val="25000"/>
+                  </a:schemeClr>
+                </a:solidFill>
+              </a:rPr>
+              <a:t>“</a:t>
+            </a:r>
+            <a:r>
+              <a:rPr lang="es-ES" sz="1400" b="0" dirty="0" smtClean="0">
+                <a:solidFill>
+                  <a:schemeClr val="tx1">
+                    <a:lumMod val="75000"/>
+                    <a:lumOff val="25000"/>
+                  </a:schemeClr>
+                </a:solidFill>
+              </a:rPr>
+              <a:t>Más que mil palabras inútiles, vale una sola que otorgue paz.</a:t>
+            </a:r>
+            <a:r>
+              <a:rPr lang="es-ES" sz="1400" b="1" dirty="0" smtClean="0">
+                <a:solidFill>
+                  <a:schemeClr val="tx1">
+                    <a:lumMod val="75000"/>
+                    <a:lumOff val="25000"/>
+                  </a:schemeClr>
+                </a:solidFill>
+              </a:rPr>
+              <a:t>”</a:t>
+            </a:r>
+            <a:r>
+              <a:rPr lang="es-ES" sz="1400" dirty="0" smtClean="0">
+                <a:solidFill>
+                  <a:schemeClr val="tx1">
+                    <a:lumMod val="75000"/>
+                    <a:lumOff val="25000"/>
+                  </a:schemeClr>
+                </a:solidFill>
+              </a:rPr>
+              <a:t>  - Buda</a:t>
+            </a:r>
+            <a:endParaRPr lang="en-US" sz="1400" dirty="0">
+              <a:solidFill>
+                <a:schemeClr val="tx1">
+                  <a:lumMod val="75000"/>
+                  <a:lumOff val="25000"/>
+                </a:schemeClr>
+              </a:solidFill>
+            </a:endParaRPr>
           </a:p>
         </p:txBody>
       </p:sp>
@@ -10183,36 +10291,6 @@
           </a:extLst>
         </p:spPr>
       </p:pic>
-      <p:sp>
-        <p:nvSpPr>
-          <p:cNvPr id="50" name="TextBox 49"/>
-          <p:cNvSpPr txBox="1"/>
-          <p:nvPr userDrawn="1"/>
-        </p:nvSpPr>
-        <p:spPr>
-          <a:xfrm>
-            <a:off x="4106098" y="285690"/>
-            <a:ext cx="1516441" cy="369332"/>
-          </a:xfrm>
-          <a:prstGeom prst="rect">
-            <a:avLst/>
-          </a:prstGeom>
-          <a:noFill/>
-        </p:spPr>
-        <p:txBody>
-          <a:bodyPr wrap="none" rtlCol="0">
-            <a:spAutoFit/>
-          </a:bodyPr>
-          <a:lstStyle/>
-          <a:p>
-            <a:r>
-              <a:rPr lang="en-US" i="1" dirty="0" smtClean="0"/>
-              <a:t>Simple is cool.</a:t>
-            </a:r>
-            <a:endParaRPr lang="en-US" i="1" dirty="0"/>
-          </a:p>
-        </p:txBody>
-      </p:sp>
       <p:grpSp>
         <p:nvGrpSpPr>
           <p:cNvPr id="51" name="Group 50"/>
@@ -11385,306 +11463,6 @@
           </p:txBody>
         </p:sp>
       </p:grpSp>
-      <p:cxnSp>
-        <p:nvCxnSpPr>
-          <p:cNvPr id="41" name="Straight Connector 40"/>
-          <p:cNvCxnSpPr/>
-          <p:nvPr userDrawn="1"/>
-        </p:nvCxnSpPr>
-        <p:spPr>
-          <a:xfrm>
-            <a:off x="0" y="5943600"/>
-            <a:ext cx="9144000" cy="0"/>
-          </a:xfrm>
-          <a:prstGeom prst="line">
-            <a:avLst/>
-          </a:prstGeom>
-          <a:ln>
-            <a:solidFill>
-              <a:schemeClr val="bg1">
-                <a:lumMod val="75000"/>
-              </a:schemeClr>
-            </a:solidFill>
-          </a:ln>
-        </p:spPr>
-        <p:style>
-          <a:lnRef idx="1">
-            <a:schemeClr val="accent1"/>
-          </a:lnRef>
-          <a:fillRef idx="0">
-            <a:schemeClr val="accent1"/>
-          </a:fillRef>
-          <a:effectRef idx="0">
-            <a:schemeClr val="accent1"/>
-          </a:effectRef>
-          <a:fontRef idx="minor">
-            <a:schemeClr val="tx1"/>
-          </a:fontRef>
-        </p:style>
-      </p:cxnSp>
-      <p:sp>
-        <p:nvSpPr>
-          <p:cNvPr id="42" name="TextBox 41"/>
-          <p:cNvSpPr txBox="1"/>
-          <p:nvPr userDrawn="1"/>
-        </p:nvSpPr>
-        <p:spPr>
-          <a:xfrm>
-            <a:off x="52300" y="6096000"/>
-            <a:ext cx="5106911" cy="369332"/>
-          </a:xfrm>
-          <a:prstGeom prst="rect">
-            <a:avLst/>
-          </a:prstGeom>
-          <a:noFill/>
-        </p:spPr>
-        <p:txBody>
-          <a:bodyPr wrap="none" rtlCol="0">
-            <a:spAutoFit/>
-          </a:bodyPr>
-          <a:lstStyle/>
-          <a:p>
-            <a:r>
-              <a:rPr lang="en-US" dirty="0" smtClean="0">
-                <a:solidFill>
-                  <a:schemeClr val="tx1">
-                    <a:lumMod val="75000"/>
-                    <a:lumOff val="25000"/>
-                  </a:schemeClr>
-                </a:solidFill>
-              </a:rPr>
-              <a:t>Osmar Briones 2018. </a:t>
-            </a:r>
-            <a:r>
-              <a:rPr lang="en-US" dirty="0" err="1" smtClean="0">
-                <a:solidFill>
-                  <a:schemeClr val="tx1">
-                    <a:lumMod val="75000"/>
-                    <a:lumOff val="25000"/>
-                  </a:schemeClr>
-                </a:solidFill>
-              </a:rPr>
-              <a:t>Todos</a:t>
-            </a:r>
-            <a:r>
-              <a:rPr lang="en-US" dirty="0" smtClean="0">
-                <a:solidFill>
-                  <a:schemeClr val="tx1">
-                    <a:lumMod val="75000"/>
-                    <a:lumOff val="25000"/>
-                  </a:schemeClr>
-                </a:solidFill>
-              </a:rPr>
-              <a:t> </a:t>
-            </a:r>
-            <a:r>
-              <a:rPr lang="en-US" dirty="0" err="1" smtClean="0">
-                <a:solidFill>
-                  <a:schemeClr val="tx1">
-                    <a:lumMod val="75000"/>
-                    <a:lumOff val="25000"/>
-                  </a:schemeClr>
-                </a:solidFill>
-              </a:rPr>
-              <a:t>los</a:t>
-            </a:r>
-            <a:r>
-              <a:rPr lang="en-US" dirty="0" smtClean="0">
-                <a:solidFill>
-                  <a:schemeClr val="tx1">
-                    <a:lumMod val="75000"/>
-                    <a:lumOff val="25000"/>
-                  </a:schemeClr>
-                </a:solidFill>
-              </a:rPr>
-              <a:t> derechos </a:t>
-            </a:r>
-            <a:r>
-              <a:rPr lang="en-US" dirty="0" err="1" smtClean="0">
-                <a:solidFill>
-                  <a:schemeClr val="tx1">
-                    <a:lumMod val="75000"/>
-                    <a:lumOff val="25000"/>
-                  </a:schemeClr>
-                </a:solidFill>
-              </a:rPr>
-              <a:t>reservados</a:t>
-            </a:r>
-            <a:r>
-              <a:rPr lang="en-US" dirty="0" smtClean="0">
-                <a:solidFill>
-                  <a:schemeClr val="tx1">
-                    <a:lumMod val="75000"/>
-                    <a:lumOff val="25000"/>
-                  </a:schemeClr>
-                </a:solidFill>
-              </a:rPr>
-              <a:t>.</a:t>
-            </a:r>
-            <a:endParaRPr lang="en-US" dirty="0">
-              <a:solidFill>
-                <a:schemeClr val="tx1">
-                  <a:lumMod val="75000"/>
-                  <a:lumOff val="25000"/>
-                </a:schemeClr>
-              </a:solidFill>
-            </a:endParaRPr>
-          </a:p>
-        </p:txBody>
-      </p:sp>
-      <p:sp>
-        <p:nvSpPr>
-          <p:cNvPr id="43" name="TextBox 42"/>
-          <p:cNvSpPr txBox="1"/>
-          <p:nvPr userDrawn="1"/>
-        </p:nvSpPr>
-        <p:spPr>
-          <a:xfrm>
-            <a:off x="76200" y="6379726"/>
-            <a:ext cx="2238562" cy="276999"/>
-          </a:xfrm>
-          <a:prstGeom prst="rect">
-            <a:avLst/>
-          </a:prstGeom>
-          <a:noFill/>
-        </p:spPr>
-        <p:txBody>
-          <a:bodyPr wrap="none" rtlCol="0">
-            <a:spAutoFit/>
-          </a:bodyPr>
-          <a:lstStyle/>
-          <a:p>
-            <a:r>
-              <a:rPr lang="en-US" sz="1200" u="sng" dirty="0" smtClean="0"/>
-              <a:t>Click here to see something nice.</a:t>
-            </a:r>
-            <a:endParaRPr lang="en-US" sz="1200" u="sng" dirty="0"/>
-          </a:p>
-        </p:txBody>
-      </p:sp>
-      <p:pic>
-        <p:nvPicPr>
-          <p:cNvPr id="44" name="Picture 2" descr="Resultado de imagen para linkedin logo"/>
-          <p:cNvPicPr>
-            <a:picLocks noChangeAspect="1" noChangeArrowheads="1"/>
-          </p:cNvPicPr>
-          <p:nvPr userDrawn="1"/>
-        </p:nvPicPr>
-        <p:blipFill>
-          <a:blip r:embed="rId2" cstate="print">
-            <a:extLst>
-              <a:ext uri="{28A0092B-C50C-407E-A947-70E740481C1C}">
-                <a14:useLocalDpi xmlns:a14="http://schemas.microsoft.com/office/drawing/2010/main" val="0"/>
-              </a:ext>
-            </a:extLst>
-          </a:blip>
-          <a:srcRect/>
-          <a:stretch>
-            <a:fillRect/>
-          </a:stretch>
-        </p:blipFill>
-        <p:spPr bwMode="auto">
-          <a:xfrm>
-            <a:off x="8548984" y="6243499"/>
-            <a:ext cx="413226" cy="413226"/>
-          </a:xfrm>
-          <a:prstGeom prst="rect">
-            <a:avLst/>
-          </a:prstGeom>
-          <a:noFill/>
-          <a:extLst>
-            <a:ext uri="{909E8E84-426E-40DD-AFC4-6F175D3DCCD1}">
-              <a14:hiddenFill xmlns:a14="http://schemas.microsoft.com/office/drawing/2010/main">
-                <a:solidFill>
-                  <a:srgbClr val="FFFFFF"/>
-                </a:solidFill>
-              </a14:hiddenFill>
-            </a:ext>
-          </a:extLst>
-        </p:spPr>
-      </p:pic>
-      <p:pic>
-        <p:nvPicPr>
-          <p:cNvPr id="45" name="Picture 8" descr="Resultado de imagen para twitter png"/>
-          <p:cNvPicPr>
-            <a:picLocks noChangeAspect="1" noChangeArrowheads="1"/>
-          </p:cNvPicPr>
-          <p:nvPr userDrawn="1"/>
-        </p:nvPicPr>
-        <p:blipFill>
-          <a:blip r:embed="rId3" cstate="print">
-            <a:extLst>
-              <a:ext uri="{28A0092B-C50C-407E-A947-70E740481C1C}">
-                <a14:useLocalDpi xmlns:a14="http://schemas.microsoft.com/office/drawing/2010/main" val="0"/>
-              </a:ext>
-            </a:extLst>
-          </a:blip>
-          <a:srcRect/>
-          <a:stretch>
-            <a:fillRect/>
-          </a:stretch>
-        </p:blipFill>
-        <p:spPr bwMode="auto">
-          <a:xfrm>
-            <a:off x="7913618" y="6243499"/>
-            <a:ext cx="528003" cy="464098"/>
-          </a:xfrm>
-          <a:prstGeom prst="rect">
-            <a:avLst/>
-          </a:prstGeom>
-          <a:noFill/>
-          <a:extLst>
-            <a:ext uri="{909E8E84-426E-40DD-AFC4-6F175D3DCCD1}">
-              <a14:hiddenFill xmlns:a14="http://schemas.microsoft.com/office/drawing/2010/main">
-                <a:solidFill>
-                  <a:srgbClr val="FFFFFF"/>
-                </a:solidFill>
-              </a14:hiddenFill>
-            </a:ext>
-          </a:extLst>
-        </p:spPr>
-      </p:pic>
-      <p:pic>
-        <p:nvPicPr>
-          <p:cNvPr id="46" name="Picture 10" descr="Resultado de imagen para facebook png"/>
-          <p:cNvPicPr>
-            <a:picLocks noChangeAspect="1" noChangeArrowheads="1"/>
-          </p:cNvPicPr>
-          <p:nvPr userDrawn="1"/>
-        </p:nvPicPr>
-        <p:blipFill>
-          <a:blip r:embed="rId4" cstate="print">
-            <a:extLst>
-              <a:ext uri="{28A0092B-C50C-407E-A947-70E740481C1C}">
-                <a14:useLocalDpi xmlns:a14="http://schemas.microsoft.com/office/drawing/2010/main" val="0"/>
-              </a:ext>
-            </a:extLst>
-          </a:blip>
-          <a:srcRect/>
-          <a:stretch>
-            <a:fillRect/>
-          </a:stretch>
-        </p:blipFill>
-        <p:spPr bwMode="auto">
-          <a:xfrm>
-            <a:off x="7363077" y="6243499"/>
-            <a:ext cx="478401" cy="478401"/>
-          </a:xfrm>
-          <a:prstGeom prst="rect">
-            <a:avLst/>
-          </a:prstGeom>
-          <a:noFill/>
-          <a:extLst>
-            <a:ext uri="{909E8E84-426E-40DD-AFC4-6F175D3DCCD1}">
-              <a14:hiddenFill xmlns:a14="http://schemas.microsoft.com/office/drawing/2010/main">
-                <a:solidFill>
-                  <a:srgbClr val="FFFFFF"/>
-                </a:solidFill>
-              </a14:hiddenFill>
-            </a:ext>
-          </a:extLst>
-        </p:spPr>
-      </p:pic>
       <p:sp>
         <p:nvSpPr>
           <p:cNvPr id="53" name="TextBox 52"/>
@@ -11997,7 +11775,7 @@
           <p:nvPr userDrawn="1"/>
         </p:nvPicPr>
         <p:blipFill>
-          <a:blip r:embed="rId5" cstate="print">
+          <a:blip r:embed="rId2" cstate="print">
             <a:extLst>
               <a:ext uri="{28A0092B-C50C-407E-A947-70E740481C1C}">
                 <a14:useLocalDpi xmlns:a14="http://schemas.microsoft.com/office/drawing/2010/main" val="0"/>
@@ -12259,16 +12037,53 @@
           </p:txBody>
         </p:sp>
       </p:grpSp>
+      <p:cxnSp>
+        <p:nvCxnSpPr>
+          <p:cNvPr id="64" name="Straight Connector 63"/>
+          <p:cNvCxnSpPr/>
+          <p:nvPr userDrawn="1"/>
+        </p:nvCxnSpPr>
+        <p:spPr>
+          <a:xfrm>
+            <a:off x="0" y="5955175"/>
+            <a:ext cx="9144000" cy="0"/>
+          </a:xfrm>
+          <a:prstGeom prst="line">
+            <a:avLst/>
+          </a:prstGeom>
+          <a:ln>
+            <a:solidFill>
+              <a:schemeClr val="bg1">
+                <a:lumMod val="75000"/>
+              </a:schemeClr>
+            </a:solidFill>
+          </a:ln>
+        </p:spPr>
+        <p:style>
+          <a:lnRef idx="1">
+            <a:schemeClr val="accent1"/>
+          </a:lnRef>
+          <a:fillRef idx="0">
+            <a:schemeClr val="accent1"/>
+          </a:fillRef>
+          <a:effectRef idx="0">
+            <a:schemeClr val="accent1"/>
+          </a:effectRef>
+          <a:fontRef idx="minor">
+            <a:schemeClr val="tx1"/>
+          </a:fontRef>
+        </p:style>
+      </p:cxnSp>
       <p:sp>
         <p:nvSpPr>
-          <p:cNvPr id="62" name="TextBox 61"/>
+          <p:cNvPr id="65" name="TextBox 64"/>
           <p:cNvSpPr txBox="1"/>
           <p:nvPr userDrawn="1"/>
         </p:nvSpPr>
         <p:spPr>
           <a:xfrm>
-            <a:off x="4106098" y="285690"/>
-            <a:ext cx="1516441" cy="369332"/>
+            <a:off x="52300" y="5991925"/>
+            <a:ext cx="5106911" cy="369332"/>
           </a:xfrm>
           <a:prstGeom prst="rect">
             <a:avLst/>
@@ -12282,10 +12097,319 @@
           <a:lstStyle/>
           <a:p>
             <a:r>
-              <a:rPr lang="en-US" i="1" dirty="0" smtClean="0"/>
-              <a:t>Simple is cool.</a:t>
+              <a:rPr lang="en-US" dirty="0" smtClean="0">
+                <a:solidFill>
+                  <a:schemeClr val="tx1">
+                    <a:lumMod val="75000"/>
+                    <a:lumOff val="25000"/>
+                  </a:schemeClr>
+                </a:solidFill>
+              </a:rPr>
+              <a:t>Osmar Briones 2018. </a:t>
             </a:r>
-            <a:endParaRPr lang="en-US" i="1" dirty="0"/>
+            <a:r>
+              <a:rPr lang="en-US" dirty="0" err="1" smtClean="0">
+                <a:solidFill>
+                  <a:schemeClr val="tx1">
+                    <a:lumMod val="75000"/>
+                    <a:lumOff val="25000"/>
+                  </a:schemeClr>
+                </a:solidFill>
+              </a:rPr>
+              <a:t>Todos</a:t>
+            </a:r>
+            <a:r>
+              <a:rPr lang="en-US" dirty="0" smtClean="0">
+                <a:solidFill>
+                  <a:schemeClr val="tx1">
+                    <a:lumMod val="75000"/>
+                    <a:lumOff val="25000"/>
+                  </a:schemeClr>
+                </a:solidFill>
+              </a:rPr>
+              <a:t> </a:t>
+            </a:r>
+            <a:r>
+              <a:rPr lang="en-US" dirty="0" err="1" smtClean="0">
+                <a:solidFill>
+                  <a:schemeClr val="tx1">
+                    <a:lumMod val="75000"/>
+                    <a:lumOff val="25000"/>
+                  </a:schemeClr>
+                </a:solidFill>
+              </a:rPr>
+              <a:t>los</a:t>
+            </a:r>
+            <a:r>
+              <a:rPr lang="en-US" dirty="0" smtClean="0">
+                <a:solidFill>
+                  <a:schemeClr val="tx1">
+                    <a:lumMod val="75000"/>
+                    <a:lumOff val="25000"/>
+                  </a:schemeClr>
+                </a:solidFill>
+              </a:rPr>
+              <a:t> derechos </a:t>
+            </a:r>
+            <a:r>
+              <a:rPr lang="en-US" dirty="0" err="1" smtClean="0">
+                <a:solidFill>
+                  <a:schemeClr val="tx1">
+                    <a:lumMod val="75000"/>
+                    <a:lumOff val="25000"/>
+                  </a:schemeClr>
+                </a:solidFill>
+              </a:rPr>
+              <a:t>reservados</a:t>
+            </a:r>
+            <a:r>
+              <a:rPr lang="en-US" dirty="0" smtClean="0">
+                <a:solidFill>
+                  <a:schemeClr val="tx1">
+                    <a:lumMod val="75000"/>
+                    <a:lumOff val="25000"/>
+                  </a:schemeClr>
+                </a:solidFill>
+              </a:rPr>
+              <a:t>.</a:t>
+            </a:r>
+            <a:endParaRPr lang="en-US" dirty="0">
+              <a:solidFill>
+                <a:schemeClr val="tx1">
+                  <a:lumMod val="75000"/>
+                  <a:lumOff val="25000"/>
+                </a:schemeClr>
+              </a:solidFill>
+            </a:endParaRPr>
+          </a:p>
+        </p:txBody>
+      </p:sp>
+      <p:sp>
+        <p:nvSpPr>
+          <p:cNvPr id="66" name="TextBox 65"/>
+          <p:cNvSpPr txBox="1"/>
+          <p:nvPr userDrawn="1"/>
+        </p:nvSpPr>
+        <p:spPr>
+          <a:xfrm>
+            <a:off x="76200" y="6275651"/>
+            <a:ext cx="2238562" cy="276999"/>
+          </a:xfrm>
+          <a:prstGeom prst="rect">
+            <a:avLst/>
+          </a:prstGeom>
+          <a:noFill/>
+        </p:spPr>
+        <p:txBody>
+          <a:bodyPr wrap="none" rtlCol="0">
+            <a:spAutoFit/>
+          </a:bodyPr>
+          <a:lstStyle/>
+          <a:p>
+            <a:r>
+              <a:rPr lang="en-US" sz="1200" u="sng" dirty="0" smtClean="0"/>
+              <a:t>Click here to see something nice.</a:t>
+            </a:r>
+            <a:endParaRPr lang="en-US" sz="1200" u="sng" dirty="0"/>
+          </a:p>
+        </p:txBody>
+      </p:sp>
+      <p:pic>
+        <p:nvPicPr>
+          <p:cNvPr id="67" name="Picture 2" descr="Resultado de imagen para linkedin logo"/>
+          <p:cNvPicPr>
+            <a:picLocks noChangeAspect="1" noChangeArrowheads="1"/>
+          </p:cNvPicPr>
+          <p:nvPr userDrawn="1"/>
+        </p:nvPicPr>
+        <p:blipFill>
+          <a:blip r:embed="rId3" cstate="print">
+            <a:extLst>
+              <a:ext uri="{28A0092B-C50C-407E-A947-70E740481C1C}">
+                <a14:useLocalDpi xmlns:a14="http://schemas.microsoft.com/office/drawing/2010/main" val="0"/>
+              </a:ext>
+            </a:extLst>
+          </a:blip>
+          <a:srcRect/>
+          <a:stretch>
+            <a:fillRect/>
+          </a:stretch>
+        </p:blipFill>
+        <p:spPr bwMode="auto">
+          <a:xfrm>
+            <a:off x="8548984" y="6086374"/>
+            <a:ext cx="413226" cy="413226"/>
+          </a:xfrm>
+          <a:prstGeom prst="rect">
+            <a:avLst/>
+          </a:prstGeom>
+          <a:noFill/>
+          <a:extLst>
+            <a:ext uri="{909E8E84-426E-40DD-AFC4-6F175D3DCCD1}">
+              <a14:hiddenFill xmlns:a14="http://schemas.microsoft.com/office/drawing/2010/main">
+                <a:solidFill>
+                  <a:srgbClr val="FFFFFF"/>
+                </a:solidFill>
+              </a14:hiddenFill>
+            </a:ext>
+          </a:extLst>
+        </p:spPr>
+      </p:pic>
+      <p:pic>
+        <p:nvPicPr>
+          <p:cNvPr id="68" name="Picture 8" descr="Resultado de imagen para twitter png"/>
+          <p:cNvPicPr>
+            <a:picLocks noChangeAspect="1" noChangeArrowheads="1"/>
+          </p:cNvPicPr>
+          <p:nvPr userDrawn="1"/>
+        </p:nvPicPr>
+        <p:blipFill>
+          <a:blip r:embed="rId4" cstate="print">
+            <a:extLst>
+              <a:ext uri="{28A0092B-C50C-407E-A947-70E740481C1C}">
+                <a14:useLocalDpi xmlns:a14="http://schemas.microsoft.com/office/drawing/2010/main" val="0"/>
+              </a:ext>
+            </a:extLst>
+          </a:blip>
+          <a:srcRect/>
+          <a:stretch>
+            <a:fillRect/>
+          </a:stretch>
+        </p:blipFill>
+        <p:spPr bwMode="auto">
+          <a:xfrm>
+            <a:off x="7913618" y="6086374"/>
+            <a:ext cx="528003" cy="464098"/>
+          </a:xfrm>
+          <a:prstGeom prst="rect">
+            <a:avLst/>
+          </a:prstGeom>
+          <a:noFill/>
+          <a:extLst>
+            <a:ext uri="{909E8E84-426E-40DD-AFC4-6F175D3DCCD1}">
+              <a14:hiddenFill xmlns:a14="http://schemas.microsoft.com/office/drawing/2010/main">
+                <a:solidFill>
+                  <a:srgbClr val="FFFFFF"/>
+                </a:solidFill>
+              </a14:hiddenFill>
+            </a:ext>
+          </a:extLst>
+        </p:spPr>
+      </p:pic>
+      <p:pic>
+        <p:nvPicPr>
+          <p:cNvPr id="69" name="Picture 10" descr="Resultado de imagen para facebook png"/>
+          <p:cNvPicPr>
+            <a:picLocks noChangeAspect="1" noChangeArrowheads="1"/>
+          </p:cNvPicPr>
+          <p:nvPr userDrawn="1"/>
+        </p:nvPicPr>
+        <p:blipFill>
+          <a:blip r:embed="rId5" cstate="print">
+            <a:extLst>
+              <a:ext uri="{28A0092B-C50C-407E-A947-70E740481C1C}">
+                <a14:useLocalDpi xmlns:a14="http://schemas.microsoft.com/office/drawing/2010/main" val="0"/>
+              </a:ext>
+            </a:extLst>
+          </a:blip>
+          <a:srcRect/>
+          <a:stretch>
+            <a:fillRect/>
+          </a:stretch>
+        </p:blipFill>
+        <p:spPr bwMode="auto">
+          <a:xfrm>
+            <a:off x="7363077" y="6086374"/>
+            <a:ext cx="478401" cy="478401"/>
+          </a:xfrm>
+          <a:prstGeom prst="rect">
+            <a:avLst/>
+          </a:prstGeom>
+          <a:noFill/>
+          <a:extLst>
+            <a:ext uri="{909E8E84-426E-40DD-AFC4-6F175D3DCCD1}">
+              <a14:hiddenFill xmlns:a14="http://schemas.microsoft.com/office/drawing/2010/main">
+                <a:solidFill>
+                  <a:srgbClr val="FFFFFF"/>
+                </a:solidFill>
+              </a14:hiddenFill>
+            </a:ext>
+          </a:extLst>
+        </p:spPr>
+      </p:pic>
+      <p:sp>
+        <p:nvSpPr>
+          <p:cNvPr id="70" name="Rectangle 69"/>
+          <p:cNvSpPr/>
+          <p:nvPr userDrawn="1"/>
+        </p:nvSpPr>
+        <p:spPr>
+          <a:xfrm>
+            <a:off x="3756950" y="6564775"/>
+            <a:ext cx="5299042" cy="307777"/>
+          </a:xfrm>
+          <a:prstGeom prst="rect">
+            <a:avLst/>
+          </a:prstGeom>
+        </p:spPr>
+        <p:txBody>
+          <a:bodyPr wrap="square">
+            <a:spAutoFit/>
+          </a:bodyPr>
+          <a:lstStyle/>
+          <a:p>
+            <a:r>
+              <a:rPr lang="es-ES" sz="1400" dirty="0" smtClean="0">
+                <a:solidFill>
+                  <a:schemeClr val="tx1">
+                    <a:lumMod val="75000"/>
+                    <a:lumOff val="25000"/>
+                  </a:schemeClr>
+                </a:solidFill>
+              </a:rPr>
+              <a:t>“</a:t>
+            </a:r>
+            <a:r>
+              <a:rPr lang="es-ES" sz="1400" b="0" dirty="0" smtClean="0">
+                <a:solidFill>
+                  <a:schemeClr val="tx1">
+                    <a:lumMod val="75000"/>
+                    <a:lumOff val="25000"/>
+                  </a:schemeClr>
+                </a:solidFill>
+              </a:rPr>
+              <a:t>Más que mil palabras inútiles, vale una sola que otorgue paz.</a:t>
+            </a:r>
+            <a:r>
+              <a:rPr lang="es-ES" sz="1400" b="1" dirty="0" smtClean="0">
+                <a:solidFill>
+                  <a:schemeClr val="tx1">
+                    <a:lumMod val="75000"/>
+                    <a:lumOff val="25000"/>
+                  </a:schemeClr>
+                </a:solidFill>
+              </a:rPr>
+              <a:t>”</a:t>
+            </a:r>
+            <a:r>
+              <a:rPr lang="es-ES" sz="1400" dirty="0" smtClean="0">
+                <a:solidFill>
+                  <a:schemeClr val="tx1">
+                    <a:lumMod val="75000"/>
+                    <a:lumOff val="25000"/>
+                  </a:schemeClr>
+                </a:solidFill>
+              </a:rPr>
+              <a:t>  - Buda</a:t>
+            </a:r>
+            <a:endParaRPr lang="en-US" sz="1400" dirty="0">
+              <a:solidFill>
+                <a:schemeClr val="tx1">
+                  <a:lumMod val="75000"/>
+                  <a:lumOff val="25000"/>
+                </a:schemeClr>
+              </a:solidFill>
+            </a:endParaRPr>
           </a:p>
         </p:txBody>
       </p:sp>
@@ -13645,7 +13769,7 @@
           <a:p>
             <a:fld id="{00791689-1FA3-4096-A498-9F8277E8D064}" type="datetimeFigureOut">
               <a:rPr lang="en-US" smtClean="0"/>
-              <a:t>10/19/2018</a:t>
+              <a:t>11/30/2018</a:t>
             </a:fld>
             <a:endParaRPr lang="en-US"/>
           </a:p>
@@ -15754,137 +15878,6 @@
       </p:grpSp>
       <p:sp>
         <p:nvSpPr>
-          <p:cNvPr id="24" name="Chevron 23"/>
-          <p:cNvSpPr/>
-          <p:nvPr/>
-        </p:nvSpPr>
-        <p:spPr>
-          <a:xfrm>
-            <a:off x="8466713" y="4190396"/>
-            <a:ext cx="285870" cy="285870"/>
-          </a:xfrm>
-          <a:custGeom>
-            <a:avLst/>
-            <a:gdLst>
-              <a:gd name="connsiteX0" fmla="*/ 0 w 762000"/>
-              <a:gd name="connsiteY0" fmla="*/ 0 h 762000"/>
-              <a:gd name="connsiteX1" fmla="*/ 136642 w 762000"/>
-              <a:gd name="connsiteY1" fmla="*/ 0 h 762000"/>
-              <a:gd name="connsiteX2" fmla="*/ 762000 w 762000"/>
-              <a:gd name="connsiteY2" fmla="*/ 381000 h 762000"/>
-              <a:gd name="connsiteX3" fmla="*/ 136642 w 762000"/>
-              <a:gd name="connsiteY3" fmla="*/ 762000 h 762000"/>
-              <a:gd name="connsiteX4" fmla="*/ 0 w 762000"/>
-              <a:gd name="connsiteY4" fmla="*/ 762000 h 762000"/>
-              <a:gd name="connsiteX5" fmla="*/ 625358 w 762000"/>
-              <a:gd name="connsiteY5" fmla="*/ 381000 h 762000"/>
-              <a:gd name="connsiteX6" fmla="*/ 0 w 762000"/>
-              <a:gd name="connsiteY6" fmla="*/ 0 h 762000"/>
-              <a:gd name="connsiteX0" fmla="*/ 0 w 762000"/>
-              <a:gd name="connsiteY0" fmla="*/ 0 h 762000"/>
-              <a:gd name="connsiteX1" fmla="*/ 136642 w 762000"/>
-              <a:gd name="connsiteY1" fmla="*/ 0 h 762000"/>
-              <a:gd name="connsiteX2" fmla="*/ 762000 w 762000"/>
-              <a:gd name="connsiteY2" fmla="*/ 381000 h 762000"/>
-              <a:gd name="connsiteX3" fmla="*/ 136642 w 762000"/>
-              <a:gd name="connsiteY3" fmla="*/ 762000 h 762000"/>
-              <a:gd name="connsiteX4" fmla="*/ 0 w 762000"/>
-              <a:gd name="connsiteY4" fmla="*/ 762000 h 762000"/>
-              <a:gd name="connsiteX5" fmla="*/ 278117 w 762000"/>
-              <a:gd name="connsiteY5" fmla="*/ 381000 h 762000"/>
-              <a:gd name="connsiteX6" fmla="*/ 0 w 762000"/>
-              <a:gd name="connsiteY6" fmla="*/ 0 h 762000"/>
-            </a:gdLst>
-            <a:ahLst/>
-            <a:cxnLst>
-              <a:cxn ang="0">
-                <a:pos x="connsiteX0" y="connsiteY0"/>
-              </a:cxn>
-              <a:cxn ang="0">
-                <a:pos x="connsiteX1" y="connsiteY1"/>
-              </a:cxn>
-              <a:cxn ang="0">
-                <a:pos x="connsiteX2" y="connsiteY2"/>
-              </a:cxn>
-              <a:cxn ang="0">
-                <a:pos x="connsiteX3" y="connsiteY3"/>
-              </a:cxn>
-              <a:cxn ang="0">
-                <a:pos x="connsiteX4" y="connsiteY4"/>
-              </a:cxn>
-              <a:cxn ang="0">
-                <a:pos x="connsiteX5" y="connsiteY5"/>
-              </a:cxn>
-              <a:cxn ang="0">
-                <a:pos x="connsiteX6" y="connsiteY6"/>
-              </a:cxn>
-            </a:cxnLst>
-            <a:rect l="l" t="t" r="r" b="b"/>
-            <a:pathLst>
-              <a:path w="762000" h="762000">
-                <a:moveTo>
-                  <a:pt x="0" y="0"/>
-                </a:moveTo>
-                <a:lnTo>
-                  <a:pt x="136642" y="0"/>
-                </a:lnTo>
-                <a:lnTo>
-                  <a:pt x="762000" y="381000"/>
-                </a:lnTo>
-                <a:lnTo>
-                  <a:pt x="136642" y="762000"/>
-                </a:lnTo>
-                <a:lnTo>
-                  <a:pt x="0" y="762000"/>
-                </a:lnTo>
-                <a:lnTo>
-                  <a:pt x="278117" y="381000"/>
-                </a:lnTo>
-                <a:lnTo>
-                  <a:pt x="0" y="0"/>
-                </a:lnTo>
-                <a:close/>
-              </a:path>
-            </a:pathLst>
-          </a:custGeom>
-          <a:noFill/>
-          <a:ln>
-            <a:solidFill>
-              <a:srgbClr val="FF0000"/>
-            </a:solidFill>
-          </a:ln>
-        </p:spPr>
-        <p:style>
-          <a:lnRef idx="2">
-            <a:schemeClr val="accent1">
-              <a:shade val="50000"/>
-            </a:schemeClr>
-          </a:lnRef>
-          <a:fillRef idx="1">
-            <a:schemeClr val="accent1"/>
-          </a:fillRef>
-          <a:effectRef idx="0">
-            <a:schemeClr val="accent1"/>
-          </a:effectRef>
-          <a:fontRef idx="minor">
-            <a:schemeClr val="lt1"/>
-          </a:fontRef>
-        </p:style>
-        <p:txBody>
-          <a:bodyPr rtlCol="0" anchor="ctr"/>
-          <a:lstStyle/>
-          <a:p>
-            <a:pPr algn="ctr"/>
-            <a:endParaRPr lang="en-US">
-              <a:solidFill>
-                <a:schemeClr val="tx1"/>
-              </a:solidFill>
-            </a:endParaRPr>
-          </a:p>
-        </p:txBody>
-      </p:sp>
-      <p:sp>
-        <p:nvSpPr>
           <p:cNvPr id="13" name="Rounded Rectangular Callout 12"/>
           <p:cNvSpPr/>
           <p:nvPr/>
@@ -16510,137 +16503,6 @@
       </p:sp>
       <p:sp>
         <p:nvSpPr>
-          <p:cNvPr id="42" name="Chevron 23"/>
-          <p:cNvSpPr/>
-          <p:nvPr/>
-        </p:nvSpPr>
-        <p:spPr>
-          <a:xfrm flipH="1">
-            <a:off x="474072" y="4255598"/>
-            <a:ext cx="285870" cy="285870"/>
-          </a:xfrm>
-          <a:custGeom>
-            <a:avLst/>
-            <a:gdLst>
-              <a:gd name="connsiteX0" fmla="*/ 0 w 762000"/>
-              <a:gd name="connsiteY0" fmla="*/ 0 h 762000"/>
-              <a:gd name="connsiteX1" fmla="*/ 136642 w 762000"/>
-              <a:gd name="connsiteY1" fmla="*/ 0 h 762000"/>
-              <a:gd name="connsiteX2" fmla="*/ 762000 w 762000"/>
-              <a:gd name="connsiteY2" fmla="*/ 381000 h 762000"/>
-              <a:gd name="connsiteX3" fmla="*/ 136642 w 762000"/>
-              <a:gd name="connsiteY3" fmla="*/ 762000 h 762000"/>
-              <a:gd name="connsiteX4" fmla="*/ 0 w 762000"/>
-              <a:gd name="connsiteY4" fmla="*/ 762000 h 762000"/>
-              <a:gd name="connsiteX5" fmla="*/ 625358 w 762000"/>
-              <a:gd name="connsiteY5" fmla="*/ 381000 h 762000"/>
-              <a:gd name="connsiteX6" fmla="*/ 0 w 762000"/>
-              <a:gd name="connsiteY6" fmla="*/ 0 h 762000"/>
-              <a:gd name="connsiteX0" fmla="*/ 0 w 762000"/>
-              <a:gd name="connsiteY0" fmla="*/ 0 h 762000"/>
-              <a:gd name="connsiteX1" fmla="*/ 136642 w 762000"/>
-              <a:gd name="connsiteY1" fmla="*/ 0 h 762000"/>
-              <a:gd name="connsiteX2" fmla="*/ 762000 w 762000"/>
-              <a:gd name="connsiteY2" fmla="*/ 381000 h 762000"/>
-              <a:gd name="connsiteX3" fmla="*/ 136642 w 762000"/>
-              <a:gd name="connsiteY3" fmla="*/ 762000 h 762000"/>
-              <a:gd name="connsiteX4" fmla="*/ 0 w 762000"/>
-              <a:gd name="connsiteY4" fmla="*/ 762000 h 762000"/>
-              <a:gd name="connsiteX5" fmla="*/ 278117 w 762000"/>
-              <a:gd name="connsiteY5" fmla="*/ 381000 h 762000"/>
-              <a:gd name="connsiteX6" fmla="*/ 0 w 762000"/>
-              <a:gd name="connsiteY6" fmla="*/ 0 h 762000"/>
-            </a:gdLst>
-            <a:ahLst/>
-            <a:cxnLst>
-              <a:cxn ang="0">
-                <a:pos x="connsiteX0" y="connsiteY0"/>
-              </a:cxn>
-              <a:cxn ang="0">
-                <a:pos x="connsiteX1" y="connsiteY1"/>
-              </a:cxn>
-              <a:cxn ang="0">
-                <a:pos x="connsiteX2" y="connsiteY2"/>
-              </a:cxn>
-              <a:cxn ang="0">
-                <a:pos x="connsiteX3" y="connsiteY3"/>
-              </a:cxn>
-              <a:cxn ang="0">
-                <a:pos x="connsiteX4" y="connsiteY4"/>
-              </a:cxn>
-              <a:cxn ang="0">
-                <a:pos x="connsiteX5" y="connsiteY5"/>
-              </a:cxn>
-              <a:cxn ang="0">
-                <a:pos x="connsiteX6" y="connsiteY6"/>
-              </a:cxn>
-            </a:cxnLst>
-            <a:rect l="l" t="t" r="r" b="b"/>
-            <a:pathLst>
-              <a:path w="762000" h="762000">
-                <a:moveTo>
-                  <a:pt x="0" y="0"/>
-                </a:moveTo>
-                <a:lnTo>
-                  <a:pt x="136642" y="0"/>
-                </a:lnTo>
-                <a:lnTo>
-                  <a:pt x="762000" y="381000"/>
-                </a:lnTo>
-                <a:lnTo>
-                  <a:pt x="136642" y="762000"/>
-                </a:lnTo>
-                <a:lnTo>
-                  <a:pt x="0" y="762000"/>
-                </a:lnTo>
-                <a:lnTo>
-                  <a:pt x="278117" y="381000"/>
-                </a:lnTo>
-                <a:lnTo>
-                  <a:pt x="0" y="0"/>
-                </a:lnTo>
-                <a:close/>
-              </a:path>
-            </a:pathLst>
-          </a:custGeom>
-          <a:noFill/>
-          <a:ln>
-            <a:solidFill>
-              <a:srgbClr val="FF0000"/>
-            </a:solidFill>
-          </a:ln>
-        </p:spPr>
-        <p:style>
-          <a:lnRef idx="2">
-            <a:schemeClr val="accent1">
-              <a:shade val="50000"/>
-            </a:schemeClr>
-          </a:lnRef>
-          <a:fillRef idx="1">
-            <a:schemeClr val="accent1"/>
-          </a:fillRef>
-          <a:effectRef idx="0">
-            <a:schemeClr val="accent1"/>
-          </a:effectRef>
-          <a:fontRef idx="minor">
-            <a:schemeClr val="lt1"/>
-          </a:fontRef>
-        </p:style>
-        <p:txBody>
-          <a:bodyPr rtlCol="0" anchor="ctr"/>
-          <a:lstStyle/>
-          <a:p>
-            <a:pPr algn="ctr"/>
-            <a:endParaRPr lang="en-US">
-              <a:solidFill>
-                <a:schemeClr val="tx1"/>
-              </a:solidFill>
-            </a:endParaRPr>
-          </a:p>
-        </p:txBody>
-      </p:sp>
-      <p:sp>
-        <p:nvSpPr>
           <p:cNvPr id="10" name="TextBox 9"/>
           <p:cNvSpPr txBox="1"/>
           <p:nvPr/>
@@ -17001,6 +16863,110 @@
           </p:txBody>
         </p:sp>
       </p:grpSp>
+      <p:sp>
+        <p:nvSpPr>
+          <p:cNvPr id="45" name="Chevron 44"/>
+          <p:cNvSpPr/>
+          <p:nvPr/>
+        </p:nvSpPr>
+        <p:spPr>
+          <a:xfrm rot="10800000">
+            <a:off x="76201" y="3952331"/>
+            <a:ext cx="762000" cy="762000"/>
+          </a:xfrm>
+          <a:prstGeom prst="chevron">
+            <a:avLst>
+              <a:gd name="adj" fmla="val 82068"/>
+            </a:avLst>
+          </a:prstGeom>
+          <a:solidFill>
+            <a:srgbClr val="FF0000"/>
+          </a:solidFill>
+          <a:ln>
+            <a:noFill/>
+          </a:ln>
+        </p:spPr>
+        <p:style>
+          <a:lnRef idx="2">
+            <a:schemeClr val="accent1">
+              <a:shade val="50000"/>
+            </a:schemeClr>
+          </a:lnRef>
+          <a:fillRef idx="1">
+            <a:schemeClr val="accent1"/>
+          </a:fillRef>
+          <a:effectRef idx="0">
+            <a:schemeClr val="accent1"/>
+          </a:effectRef>
+          <a:fontRef idx="minor">
+            <a:schemeClr val="lt1"/>
+          </a:fontRef>
+        </p:style>
+        <p:txBody>
+          <a:bodyPr rtlCol="0" anchor="ctr"/>
+          <a:lstStyle/>
+          <a:p>
+            <a:pPr algn="ctr"/>
+            <a:endParaRPr lang="en-US">
+              <a:solidFill>
+                <a:schemeClr val="tx1"/>
+              </a:solidFill>
+            </a:endParaRPr>
+          </a:p>
+        </p:txBody>
+      </p:sp>
+      <p:sp>
+        <p:nvSpPr>
+          <p:cNvPr id="46" name="Chevron 45"/>
+          <p:cNvSpPr/>
+          <p:nvPr/>
+        </p:nvSpPr>
+        <p:spPr>
+          <a:xfrm>
+            <a:off x="8305800" y="4018054"/>
+            <a:ext cx="762000" cy="762000"/>
+          </a:xfrm>
+          <a:prstGeom prst="chevron">
+            <a:avLst>
+              <a:gd name="adj" fmla="val 82068"/>
+            </a:avLst>
+          </a:prstGeom>
+          <a:solidFill>
+            <a:srgbClr val="FF0000"/>
+          </a:solidFill>
+          <a:ln>
+            <a:noFill/>
+          </a:ln>
+        </p:spPr>
+        <p:style>
+          <a:lnRef idx="2">
+            <a:schemeClr val="accent1">
+              <a:shade val="50000"/>
+            </a:schemeClr>
+          </a:lnRef>
+          <a:fillRef idx="1">
+            <a:schemeClr val="accent1"/>
+          </a:fillRef>
+          <a:effectRef idx="0">
+            <a:schemeClr val="accent1"/>
+          </a:effectRef>
+          <a:fontRef idx="minor">
+            <a:schemeClr val="lt1"/>
+          </a:fontRef>
+        </p:style>
+        <p:txBody>
+          <a:bodyPr rtlCol="0" anchor="ctr"/>
+          <a:lstStyle/>
+          <a:p>
+            <a:pPr algn="ctr"/>
+            <a:endParaRPr lang="en-US">
+              <a:solidFill>
+                <a:schemeClr val="tx1"/>
+              </a:solidFill>
+            </a:endParaRPr>
+          </a:p>
+        </p:txBody>
+      </p:sp>
     </p:spTree>
     <p:extLst>
       <p:ext uri="{BB962C8B-B14F-4D97-AF65-F5344CB8AC3E}">
@@ -19115,11 +19081,20 @@
               <a:rPr lang="en-US" sz="1200" dirty="0">
                 <a:latin typeface="Bahnschrift Light" panose="020B0502040204020203" pitchFamily="34" charset="0"/>
               </a:rPr>
-              <a:t> which is a platform more focused to that aspect, this page is for my personal and continuous improvement.</a:t>
+              <a:t> which is a platform more focused </a:t>
             </a:r>
-            <a:endParaRPr lang="en-US" sz="1200" dirty="0">
-              <a:latin typeface="Bahnschrift Light" panose="020B0502040204020203" pitchFamily="34" charset="0"/>
-            </a:endParaRPr>
+            <a:r>
+              <a:rPr lang="en-US" sz="1200" smtClean="0">
+                <a:latin typeface="Bahnschrift Light" panose="020B0502040204020203" pitchFamily="34" charset="0"/>
+              </a:rPr>
+              <a:t>on that, </a:t>
+            </a:r>
+            <a:r>
+              <a:rPr lang="en-US" sz="1200" dirty="0">
+                <a:latin typeface="Bahnschrift Light" panose="020B0502040204020203" pitchFamily="34" charset="0"/>
+              </a:rPr>
+              <a:t>this page is for my personal and continuous improvement.</a:t>
+            </a:r>
           </a:p>
         </p:txBody>
       </p:sp>

</xml_diff>

<commit_message>
Bold in fields of contact
</commit_message>
<xml_diff>
--- a/screens.pptx
+++ b/screens.pptx
@@ -13769,7 +13769,7 @@
           <a:p>
             <a:fld id="{00791689-1FA3-4096-A498-9F8277E8D064}" type="datetimeFigureOut">
               <a:rPr lang="en-US" smtClean="0"/>
-              <a:t>11/30/2018</a:t>
+              <a:t>12/3/2018</a:t>
             </a:fld>
             <a:endParaRPr lang="en-US"/>
           </a:p>
@@ -18841,10 +18841,16 @@
               </a:rPr>
             </a:br>
             <a:r>
+              <a:rPr lang="es-ES" sz="1400" b="1" dirty="0" smtClean="0">
+                <a:latin typeface="Bahnschrift Light" panose="020B0502040204020203" pitchFamily="34" charset="0"/>
+              </a:rPr>
+              <a:t>E-mail:</a:t>
+            </a:r>
+            <a:r>
               <a:rPr lang="es-ES" sz="1400" dirty="0" smtClean="0">
                 <a:latin typeface="Bahnschrift Light" panose="020B0502040204020203" pitchFamily="34" charset="0"/>
               </a:rPr>
-              <a:t>E-mail: </a:t>
+              <a:t> </a:t>
             </a:r>
             <a:r>
               <a:rPr lang="es-ES" sz="1400" dirty="0" smtClean="0">
@@ -18865,10 +18871,16 @@
               </a:rPr>
             </a:br>
             <a:r>
+              <a:rPr lang="es-ES" sz="1400" b="1" dirty="0" smtClean="0">
+                <a:latin typeface="Bahnschrift Light" panose="020B0502040204020203" pitchFamily="34" charset="0"/>
+              </a:rPr>
+              <a:t>Facebook:</a:t>
+            </a:r>
+            <a:r>
               <a:rPr lang="es-ES" sz="1400" dirty="0" smtClean="0">
                 <a:latin typeface="Bahnschrift Light" panose="020B0502040204020203" pitchFamily="34" charset="0"/>
               </a:rPr>
-              <a:t>Facebook: </a:t>
+              <a:t> </a:t>
             </a:r>
             <a:r>
               <a:rPr lang="es-ES" sz="1400" dirty="0" err="1" smtClean="0">
@@ -18888,10 +18900,16 @@
               </a:rPr>
             </a:br>
             <a:r>
+              <a:rPr lang="es-ES" sz="1400" b="1" dirty="0" smtClean="0">
+                <a:latin typeface="Bahnschrift Light" panose="020B0502040204020203" pitchFamily="34" charset="0"/>
+              </a:rPr>
+              <a:t>Twitter:</a:t>
+            </a:r>
+            <a:r>
               <a:rPr lang="es-ES" sz="1400" dirty="0" smtClean="0">
                 <a:latin typeface="Bahnschrift Light" panose="020B0502040204020203" pitchFamily="34" charset="0"/>
               </a:rPr>
-              <a:t>Twitter: @</a:t>
+              <a:t> @</a:t>
             </a:r>
             <a:r>
               <a:rPr lang="es-ES" sz="1400" dirty="0" err="1" smtClean="0">
@@ -18905,16 +18923,22 @@
           </a:p>
           <a:p>
             <a:r>
-              <a:rPr lang="es-ES" sz="1400" dirty="0" err="1" smtClean="0">
+              <a:rPr lang="es-ES" sz="1400" b="1" dirty="0" err="1" smtClean="0">
                 <a:latin typeface="Bahnschrift Light" panose="020B0502040204020203" pitchFamily="34" charset="0"/>
               </a:rPr>
               <a:t>LinkdedIn</a:t>
             </a:r>
             <a:r>
+              <a:rPr lang="es-ES" sz="1400" b="1" dirty="0" smtClean="0">
+                <a:latin typeface="Bahnschrift Light" panose="020B0502040204020203" pitchFamily="34" charset="0"/>
+              </a:rPr>
+              <a:t>:</a:t>
+            </a:r>
+            <a:r>
               <a:rPr lang="es-ES" sz="1400" dirty="0" smtClean="0">
                 <a:latin typeface="Bahnschrift Light" panose="020B0502040204020203" pitchFamily="34" charset="0"/>
               </a:rPr>
-              <a:t>: </a:t>
+              <a:t> </a:t>
             </a:r>
             <a:r>
               <a:rPr lang="es-ES" sz="1400" dirty="0" err="1" smtClean="0">

</xml_diff>